<commit_message>
added more details to workshop 1x
</commit_message>
<xml_diff>
--- a/workshop1x/WSNatwork - workshop1 - 1.pptx
+++ b/workshop1x/WSNatwork - workshop1 - 1.pptx
@@ -5,10 +5,10 @@
     <p:sldMasterId id="2147483648" r:id="rId1"/>
   </p:sldMasterIdLst>
   <p:notesMasterIdLst>
-    <p:notesMasterId r:id="rId20"/>
+    <p:notesMasterId r:id="rId21"/>
   </p:notesMasterIdLst>
   <p:handoutMasterIdLst>
-    <p:handoutMasterId r:id="rId21"/>
+    <p:handoutMasterId r:id="rId22"/>
   </p:handoutMasterIdLst>
   <p:sldIdLst>
     <p:sldId id="285" r:id="rId2"/>
@@ -26,12 +26,13 @@
     <p:sldId id="277" r:id="rId14"/>
     <p:sldId id="308" r:id="rId15"/>
     <p:sldId id="309" r:id="rId16"/>
-    <p:sldId id="307" r:id="rId17"/>
-    <p:sldId id="306" r:id="rId18"/>
-    <p:sldId id="310" r:id="rId19"/>
+    <p:sldId id="311" r:id="rId17"/>
+    <p:sldId id="307" r:id="rId18"/>
+    <p:sldId id="306" r:id="rId19"/>
+    <p:sldId id="310" r:id="rId20"/>
   </p:sldIdLst>
   <p:sldSz cx="9144000" cy="6858000" type="screen4x3"/>
-  <p:notesSz cx="6858000" cy="9144000"/>
+  <p:notesSz cx="6794500" cy="9906000"/>
   <p:defaultTextStyle>
     <a:defPPr>
       <a:defRPr lang="es-ES"/>
@@ -195,7 +196,7 @@
         <p:spPr>
           <a:xfrm>
             <a:off x="0" y="0"/>
-            <a:ext cx="2971800" cy="457200"/>
+            <a:ext cx="2944283" cy="495300"/>
           </a:xfrm>
           <a:prstGeom prst="rect">
             <a:avLst/>
@@ -225,8 +226,8 @@
         </p:nvSpPr>
         <p:spPr>
           <a:xfrm>
-            <a:off x="3884613" y="0"/>
-            <a:ext cx="2971800" cy="457200"/>
+            <a:off x="3848645" y="0"/>
+            <a:ext cx="2944283" cy="495300"/>
           </a:xfrm>
           <a:prstGeom prst="rect">
             <a:avLst/>
@@ -243,7 +244,7 @@
             <a:fld id="{42C944E5-7267-49E9-9024-F89C14269E11}" type="datetimeFigureOut">
               <a:rPr lang="nl-NL" smtClean="0"/>
               <a:pPr/>
-              <a:t>15-12-2015</a:t>
+              <a:t>15-2-2016</a:t>
             </a:fld>
             <a:endParaRPr lang="nl-NL"/>
           </a:p>
@@ -261,8 +262,8 @@
         </p:nvSpPr>
         <p:spPr>
           <a:xfrm>
-            <a:off x="0" y="8685213"/>
-            <a:ext cx="2971800" cy="457200"/>
+            <a:off x="0" y="9408981"/>
+            <a:ext cx="2944283" cy="495300"/>
           </a:xfrm>
           <a:prstGeom prst="rect">
             <a:avLst/>
@@ -292,8 +293,8 @@
         </p:nvSpPr>
         <p:spPr>
           <a:xfrm>
-            <a:off x="3884613" y="8685213"/>
-            <a:ext cx="2971800" cy="457200"/>
+            <a:off x="3848645" y="9408981"/>
+            <a:ext cx="2944283" cy="495300"/>
           </a:xfrm>
           <a:prstGeom prst="rect">
             <a:avLst/>
@@ -310,7 +311,7 @@
             <a:fld id="{A16616E0-91A4-499E-81B1-0CF0F465E4C4}" type="slidenum">
               <a:rPr lang="nl-NL" smtClean="0"/>
               <a:pPr/>
-              <a:t>‹nr.›</a:t>
+              <a:t>‹#›</a:t>
             </a:fld>
             <a:endParaRPr lang="nl-NL"/>
           </a:p>
@@ -319,7 +320,7 @@
     </p:spTree>
     <p:extLst>
       <p:ext uri="{BB962C8B-B14F-4D97-AF65-F5344CB8AC3E}">
-        <p14:creationId xmlns:p14="http://schemas.microsoft.com/office/powerpoint/2010/main" val="1606511199"/>
+        <p14:creationId xmlns="" xmlns:p14="http://schemas.microsoft.com/office/powerpoint/2010/main" val="1606511199"/>
       </p:ext>
     </p:extLst>
   </p:cSld>
@@ -362,7 +363,7 @@
         <p:spPr>
           <a:xfrm>
             <a:off x="0" y="0"/>
-            <a:ext cx="2971800" cy="457200"/>
+            <a:ext cx="2944283" cy="495300"/>
           </a:xfrm>
           <a:prstGeom prst="rect">
             <a:avLst/>
@@ -392,8 +393,8 @@
         </p:nvSpPr>
         <p:spPr>
           <a:xfrm>
-            <a:off x="3884613" y="0"/>
-            <a:ext cx="2971800" cy="457200"/>
+            <a:off x="3848645" y="0"/>
+            <a:ext cx="2944283" cy="495300"/>
           </a:xfrm>
           <a:prstGeom prst="rect">
             <a:avLst/>
@@ -410,7 +411,7 @@
             <a:fld id="{BBBD1AA2-88FB-4D6F-95D1-F27A8A41D388}" type="datetimeFigureOut">
               <a:rPr lang="nl-BE" smtClean="0"/>
               <a:pPr/>
-              <a:t>15/12/2015</a:t>
+              <a:t>15/02/2016</a:t>
             </a:fld>
             <a:endParaRPr lang="nl-BE"/>
           </a:p>
@@ -428,8 +429,8 @@
         </p:nvSpPr>
         <p:spPr>
           <a:xfrm>
-            <a:off x="1143000" y="685800"/>
-            <a:ext cx="4572000" cy="3429000"/>
+            <a:off x="920750" y="742950"/>
+            <a:ext cx="4953000" cy="3714750"/>
           </a:xfrm>
           <a:prstGeom prst="rect">
             <a:avLst/>
@@ -461,8 +462,8 @@
         </p:nvSpPr>
         <p:spPr>
           <a:xfrm>
-            <a:off x="685800" y="4343400"/>
-            <a:ext cx="5486400" cy="4114800"/>
+            <a:off x="679450" y="4705350"/>
+            <a:ext cx="5435600" cy="4457700"/>
           </a:xfrm>
           <a:prstGeom prst="rect">
             <a:avLst/>
@@ -523,8 +524,8 @@
         </p:nvSpPr>
         <p:spPr>
           <a:xfrm>
-            <a:off x="0" y="8685213"/>
-            <a:ext cx="2971800" cy="457200"/>
+            <a:off x="0" y="9408981"/>
+            <a:ext cx="2944283" cy="495300"/>
           </a:xfrm>
           <a:prstGeom prst="rect">
             <a:avLst/>
@@ -554,8 +555,8 @@
         </p:nvSpPr>
         <p:spPr>
           <a:xfrm>
-            <a:off x="3884613" y="8685213"/>
-            <a:ext cx="2971800" cy="457200"/>
+            <a:off x="3848645" y="9408981"/>
+            <a:ext cx="2944283" cy="495300"/>
           </a:xfrm>
           <a:prstGeom prst="rect">
             <a:avLst/>
@@ -572,7 +573,7 @@
             <a:fld id="{85439C94-657D-4310-B2E0-6C3DD422A537}" type="slidenum">
               <a:rPr lang="nl-BE" smtClean="0"/>
               <a:pPr/>
-              <a:t>‹nr.›</a:t>
+              <a:t>‹#›</a:t>
             </a:fld>
             <a:endParaRPr lang="nl-BE"/>
           </a:p>
@@ -581,7 +582,7 @@
     </p:spTree>
     <p:extLst>
       <p:ext uri="{BB962C8B-B14F-4D97-AF65-F5344CB8AC3E}">
-        <p14:creationId xmlns:p14="http://schemas.microsoft.com/office/powerpoint/2010/main" val="3067019558"/>
+        <p14:creationId xmlns="" xmlns:p14="http://schemas.microsoft.com/office/powerpoint/2010/main" val="3067019558"/>
       </p:ext>
     </p:extLst>
   </p:cSld>
@@ -756,7 +757,7 @@
     </p:spTree>
     <p:extLst>
       <p:ext uri="{BB962C8B-B14F-4D97-AF65-F5344CB8AC3E}">
-        <p14:creationId xmlns:p14="http://schemas.microsoft.com/office/powerpoint/2010/main" val="1749249067"/>
+        <p14:creationId xmlns="" xmlns:p14="http://schemas.microsoft.com/office/powerpoint/2010/main" val="1749249067"/>
       </p:ext>
     </p:extLst>
   </p:cSld>
@@ -1491,6 +1492,88 @@
               <a:rPr lang="nl-BE" smtClean="0"/>
               <a:pPr/>
               <a:t>18</a:t>
+            </a:fld>
+            <a:endParaRPr lang="nl-BE"/>
+          </a:p>
+        </p:txBody>
+      </p:sp>
+    </p:spTree>
+  </p:cSld>
+  <p:clrMapOvr>
+    <a:masterClrMapping/>
+  </p:clrMapOvr>
+</p:notes>
+</file>
+
+<file path=ppt/notesSlides/notesSlide19.xml><?xml version="1.0" encoding="utf-8"?>
+<p:notes xmlns:a="http://schemas.openxmlformats.org/drawingml/2006/main" xmlns:r="http://schemas.openxmlformats.org/officeDocument/2006/relationships" xmlns:p="http://schemas.openxmlformats.org/presentationml/2006/main">
+  <p:cSld>
+    <p:spTree>
+      <p:nvGrpSpPr>
+        <p:cNvPr id="1" name=""/>
+        <p:cNvGrpSpPr/>
+        <p:nvPr/>
+      </p:nvGrpSpPr>
+      <p:grpSpPr>
+        <a:xfrm>
+          <a:off x="0" y="0"/>
+          <a:ext cx="0" cy="0"/>
+          <a:chOff x="0" y="0"/>
+          <a:chExt cx="0" cy="0"/>
+        </a:xfrm>
+      </p:grpSpPr>
+      <p:sp>
+        <p:nvSpPr>
+          <p:cNvPr id="2" name="Tijdelijke aanduiding voor dia-afbeelding 1"/>
+          <p:cNvSpPr>
+            <a:spLocks noGrp="1" noRot="1" noChangeAspect="1"/>
+          </p:cNvSpPr>
+          <p:nvPr>
+            <p:ph type="sldImg"/>
+          </p:nvPr>
+        </p:nvSpPr>
+        <p:spPr/>
+      </p:sp>
+      <p:sp>
+        <p:nvSpPr>
+          <p:cNvPr id="3" name="Tijdelijke aanduiding voor notities 2"/>
+          <p:cNvSpPr>
+            <a:spLocks noGrp="1"/>
+          </p:cNvSpPr>
+          <p:nvPr>
+            <p:ph type="body" idx="1"/>
+          </p:nvPr>
+        </p:nvSpPr>
+        <p:spPr/>
+        <p:txBody>
+          <a:bodyPr>
+            <a:normAutofit/>
+          </a:bodyPr>
+          <a:lstStyle/>
+          <a:p>
+            <a:endParaRPr lang="nl-BE" dirty="0"/>
+          </a:p>
+        </p:txBody>
+      </p:sp>
+      <p:sp>
+        <p:nvSpPr>
+          <p:cNvPr id="4" name="Tijdelijke aanduiding voor dianummer 3"/>
+          <p:cNvSpPr>
+            <a:spLocks noGrp="1"/>
+          </p:cNvSpPr>
+          <p:nvPr>
+            <p:ph type="sldNum" sz="quarter" idx="10"/>
+          </p:nvPr>
+        </p:nvSpPr>
+        <p:spPr/>
+        <p:txBody>
+          <a:bodyPr/>
+          <a:lstStyle/>
+          <a:p>
+            <a:fld id="{85439C94-657D-4310-B2E0-6C3DD422A537}" type="slidenum">
+              <a:rPr lang="nl-BE" smtClean="0"/>
+              <a:pPr/>
+              <a:t>19</a:t>
             </a:fld>
             <a:endParaRPr lang="nl-BE"/>
           </a:p>
@@ -2355,7 +2438,7 @@
               <a:pPr>
                 <a:defRPr/>
               </a:pPr>
-              <a:t>‹nr.›</a:t>
+              <a:t>‹#›</a:t>
             </a:fld>
             <a:endParaRPr lang="es-ES"/>
           </a:p>
@@ -2546,7 +2629,7 @@
               <a:pPr>
                 <a:defRPr/>
               </a:pPr>
-              <a:t>‹nr.›</a:t>
+              <a:t>‹#›</a:t>
             </a:fld>
             <a:endParaRPr lang="es-ES"/>
           </a:p>
@@ -2747,7 +2830,7 @@
               <a:pPr>
                 <a:defRPr/>
               </a:pPr>
-              <a:t>‹nr.›</a:t>
+              <a:t>‹#›</a:t>
             </a:fld>
             <a:endParaRPr lang="es-ES"/>
           </a:p>
@@ -2938,7 +3021,7 @@
               <a:pPr>
                 <a:defRPr/>
               </a:pPr>
-              <a:t>‹nr.›</a:t>
+              <a:t>‹#›</a:t>
             </a:fld>
             <a:endParaRPr lang="es-ES"/>
           </a:p>
@@ -3151,7 +3234,7 @@
               <a:pPr>
                 <a:defRPr/>
               </a:pPr>
-              <a:t>‹nr.›</a:t>
+              <a:t>‹#›</a:t>
             </a:fld>
             <a:endParaRPr lang="es-ES"/>
           </a:p>
@@ -3460,7 +3543,7 @@
               <a:pPr>
                 <a:defRPr/>
               </a:pPr>
-              <a:t>‹nr.›</a:t>
+              <a:t>‹#›</a:t>
             </a:fld>
             <a:endParaRPr lang="es-ES"/>
           </a:p>
@@ -3903,7 +3986,7 @@
               <a:pPr>
                 <a:defRPr/>
               </a:pPr>
-              <a:t>‹nr.›</a:t>
+              <a:t>‹#›</a:t>
             </a:fld>
             <a:endParaRPr lang="es-ES"/>
           </a:p>
@@ -4042,7 +4125,7 @@
               <a:pPr>
                 <a:defRPr/>
               </a:pPr>
-              <a:t>‹nr.›</a:t>
+              <a:t>‹#›</a:t>
             </a:fld>
             <a:endParaRPr lang="es-ES"/>
           </a:p>
@@ -4158,7 +4241,7 @@
               <a:pPr>
                 <a:defRPr/>
               </a:pPr>
-              <a:t>‹nr.›</a:t>
+              <a:t>‹#›</a:t>
             </a:fld>
             <a:endParaRPr lang="es-ES"/>
           </a:p>
@@ -4456,7 +4539,7 @@
               <a:pPr>
                 <a:defRPr/>
               </a:pPr>
-              <a:t>‹nr.›</a:t>
+              <a:t>‹#›</a:t>
             </a:fld>
             <a:endParaRPr lang="es-ES"/>
           </a:p>
@@ -4731,7 +4814,7 @@
               <a:pPr>
                 <a:defRPr/>
               </a:pPr>
-              <a:t>‹nr.›</a:t>
+              <a:t>‹#›</a:t>
             </a:fld>
             <a:endParaRPr lang="es-ES"/>
           </a:p>
@@ -4913,14 +4996,14 @@
           <a:effectLst/>
           <a:extLst>
             <a:ext uri="{909E8E84-426E-40DD-AFC4-6F175D3DCCD1}">
-              <a14:hiddenFill xmlns:a14="http://schemas.microsoft.com/office/drawing/2010/main">
+              <a14:hiddenFill xmlns="" xmlns:a14="http://schemas.microsoft.com/office/drawing/2010/main">
                 <a:solidFill>
                   <a:schemeClr val="accent1"/>
                 </a:solidFill>
               </a14:hiddenFill>
             </a:ext>
             <a:ext uri="{91240B29-F687-4F45-9708-019B960494DF}">
-              <a14:hiddenLine xmlns:a14="http://schemas.microsoft.com/office/drawing/2010/main" w="9525">
+              <a14:hiddenLine xmlns="" xmlns:a14="http://schemas.microsoft.com/office/drawing/2010/main" w="9525">
                 <a:solidFill>
                   <a:schemeClr val="tx1"/>
                 </a:solidFill>
@@ -4930,7 +5013,7 @@
               </a14:hiddenLine>
             </a:ext>
             <a:ext uri="{AF507438-7753-43E0-B8FC-AC1667EBCBE1}">
-              <a14:hiddenEffects xmlns:a14="http://schemas.microsoft.com/office/drawing/2010/main">
+              <a14:hiddenEffects xmlns="" xmlns:a14="http://schemas.microsoft.com/office/drawing/2010/main">
                 <a:effectLst>
                   <a:outerShdw dist="35921" dir="2700000" algn="ctr" rotWithShape="0">
                     <a:schemeClr val="bg2"/>
@@ -4986,14 +5069,14 @@
           <a:effectLst/>
           <a:extLst>
             <a:ext uri="{909E8E84-426E-40DD-AFC4-6F175D3DCCD1}">
-              <a14:hiddenFill xmlns:a14="http://schemas.microsoft.com/office/drawing/2010/main">
+              <a14:hiddenFill xmlns="" xmlns:a14="http://schemas.microsoft.com/office/drawing/2010/main">
                 <a:solidFill>
                   <a:schemeClr val="accent1"/>
                 </a:solidFill>
               </a14:hiddenFill>
             </a:ext>
             <a:ext uri="{91240B29-F687-4F45-9708-019B960494DF}">
-              <a14:hiddenLine xmlns:a14="http://schemas.microsoft.com/office/drawing/2010/main" w="9525">
+              <a14:hiddenLine xmlns="" xmlns:a14="http://schemas.microsoft.com/office/drawing/2010/main" w="9525">
                 <a:solidFill>
                   <a:schemeClr val="tx1"/>
                 </a:solidFill>
@@ -5003,7 +5086,7 @@
               </a14:hiddenLine>
             </a:ext>
             <a:ext uri="{AF507438-7753-43E0-B8FC-AC1667EBCBE1}">
-              <a14:hiddenEffects xmlns:a14="http://schemas.microsoft.com/office/drawing/2010/main">
+              <a14:hiddenEffects xmlns="" xmlns:a14="http://schemas.microsoft.com/office/drawing/2010/main">
                 <a:effectLst>
                   <a:outerShdw dist="35921" dir="2700000" algn="ctr" rotWithShape="0">
                     <a:schemeClr val="bg2"/>
@@ -5059,14 +5142,14 @@
           <a:effectLst/>
           <a:extLst>
             <a:ext uri="{909E8E84-426E-40DD-AFC4-6F175D3DCCD1}">
-              <a14:hiddenFill xmlns:a14="http://schemas.microsoft.com/office/drawing/2010/main">
+              <a14:hiddenFill xmlns="" xmlns:a14="http://schemas.microsoft.com/office/drawing/2010/main">
                 <a:solidFill>
                   <a:schemeClr val="accent1"/>
                 </a:solidFill>
               </a14:hiddenFill>
             </a:ext>
             <a:ext uri="{91240B29-F687-4F45-9708-019B960494DF}">
-              <a14:hiddenLine xmlns:a14="http://schemas.microsoft.com/office/drawing/2010/main" w="9525">
+              <a14:hiddenLine xmlns="" xmlns:a14="http://schemas.microsoft.com/office/drawing/2010/main" w="9525">
                 <a:solidFill>
                   <a:schemeClr val="tx1"/>
                 </a:solidFill>
@@ -5076,7 +5159,7 @@
               </a14:hiddenLine>
             </a:ext>
             <a:ext uri="{AF507438-7753-43E0-B8FC-AC1667EBCBE1}">
-              <a14:hiddenEffects xmlns:a14="http://schemas.microsoft.com/office/drawing/2010/main">
+              <a14:hiddenEffects xmlns="" xmlns:a14="http://schemas.microsoft.com/office/drawing/2010/main">
                 <a:effectLst>
                   <a:outerShdw dist="35921" dir="2700000" algn="ctr" rotWithShape="0">
                     <a:schemeClr val="bg2"/>
@@ -5108,7 +5191,7 @@
               <a:pPr>
                 <a:defRPr/>
               </a:pPr>
-              <a:t>‹nr.›</a:t>
+              <a:t>‹#›</a:t>
             </a:fld>
             <a:endParaRPr lang="es-ES"/>
           </a:p>
@@ -5593,7 +5676,7 @@
     </p:spTree>
     <p:extLst>
       <p:ext uri="{BB962C8B-B14F-4D97-AF65-F5344CB8AC3E}">
-        <p14:creationId xmlns:p14="http://schemas.microsoft.com/office/powerpoint/2010/main" val="783016"/>
+        <p14:creationId xmlns="" xmlns:p14="http://schemas.microsoft.com/office/powerpoint/2010/main" val="783016"/>
       </p:ext>
     </p:extLst>
   </p:cSld>
@@ -6127,7 +6210,7 @@
           <a:blip r:embed="rId3" cstate="print">
             <a:extLst>
               <a:ext uri="{28A0092B-C50C-407E-A947-70E740481C1C}">
-                <a14:useLocalDpi xmlns:a14="http://schemas.microsoft.com/office/drawing/2010/main" val="0"/>
+                <a14:useLocalDpi xmlns="" xmlns:a14="http://schemas.microsoft.com/office/drawing/2010/main" val="0"/>
               </a:ext>
             </a:extLst>
           </a:blip>
@@ -6147,7 +6230,7 @@
           <a:noFill/>
           <a:extLst>
             <a:ext uri="{909E8E84-426E-40DD-AFC4-6F175D3DCCD1}">
-              <a14:hiddenFill xmlns:a14="http://schemas.microsoft.com/office/drawing/2010/main">
+              <a14:hiddenFill xmlns="" xmlns:a14="http://schemas.microsoft.com/office/drawing/2010/main">
                 <a:solidFill>
                   <a:srgbClr val="FFFFFF"/>
                 </a:solidFill>
@@ -6214,7 +6297,7 @@
           <a:blip r:embed="rId4" cstate="print">
             <a:extLst>
               <a:ext uri="{28A0092B-C50C-407E-A947-70E740481C1C}">
-                <a14:useLocalDpi xmlns:a14="http://schemas.microsoft.com/office/drawing/2010/main" val="0"/>
+                <a14:useLocalDpi xmlns="" xmlns:a14="http://schemas.microsoft.com/office/drawing/2010/main" val="0"/>
               </a:ext>
             </a:extLst>
           </a:blip>
@@ -6234,7 +6317,7 @@
           <a:noFill/>
           <a:extLst>
             <a:ext uri="{909E8E84-426E-40DD-AFC4-6F175D3DCCD1}">
-              <a14:hiddenFill xmlns:a14="http://schemas.microsoft.com/office/drawing/2010/main">
+              <a14:hiddenFill xmlns="" xmlns:a14="http://schemas.microsoft.com/office/drawing/2010/main">
                 <a:solidFill>
                   <a:srgbClr val="FFFFFF"/>
                 </a:solidFill>
@@ -6292,7 +6375,7 @@
     </p:spTree>
     <p:extLst>
       <p:ext uri="{BB962C8B-B14F-4D97-AF65-F5344CB8AC3E}">
-        <p14:creationId xmlns:p14="http://schemas.microsoft.com/office/powerpoint/2010/main" val="2325780116"/>
+        <p14:creationId xmlns="" xmlns:p14="http://schemas.microsoft.com/office/powerpoint/2010/main" val="2325780116"/>
       </p:ext>
     </p:extLst>
   </p:cSld>
@@ -6588,7 +6671,7 @@
           <a:blip r:embed="rId3" cstate="print">
             <a:extLst>
               <a:ext uri="{28A0092B-C50C-407E-A947-70E740481C1C}">
-                <a14:useLocalDpi xmlns:a14="http://schemas.microsoft.com/office/drawing/2010/main" val="0"/>
+                <a14:useLocalDpi xmlns="" xmlns:a14="http://schemas.microsoft.com/office/drawing/2010/main" val="0"/>
               </a:ext>
             </a:extLst>
           </a:blip>
@@ -6608,7 +6691,7 @@
           <a:noFill/>
           <a:extLst>
             <a:ext uri="{909E8E84-426E-40DD-AFC4-6F175D3DCCD1}">
-              <a14:hiddenFill xmlns:a14="http://schemas.microsoft.com/office/drawing/2010/main">
+              <a14:hiddenFill xmlns="" xmlns:a14="http://schemas.microsoft.com/office/drawing/2010/main">
                 <a:solidFill>
                   <a:srgbClr val="FFFFFF"/>
                 </a:solidFill>
@@ -6664,10 +6747,10 @@
           <p:nvPr/>
         </p:nvPicPr>
         <p:blipFill>
-          <a:blip r:embed="rId4">
+          <a:blip r:embed="rId4" cstate="print">
             <a:extLst>
               <a:ext uri="{28A0092B-C50C-407E-A947-70E740481C1C}">
-                <a14:useLocalDpi xmlns:a14="http://schemas.microsoft.com/office/drawing/2010/main" val="0"/>
+                <a14:useLocalDpi xmlns="" xmlns:a14="http://schemas.microsoft.com/office/drawing/2010/main" val="0"/>
               </a:ext>
             </a:extLst>
           </a:blip>
@@ -6690,14 +6773,14 @@
           </a:ln>
           <a:extLst>
             <a:ext uri="{909E8E84-426E-40DD-AFC4-6F175D3DCCD1}">
-              <a14:hiddenFill xmlns:a14="http://schemas.microsoft.com/office/drawing/2010/main">
+              <a14:hiddenFill xmlns="" xmlns:a14="http://schemas.microsoft.com/office/drawing/2010/main">
                 <a:solidFill>
                   <a:schemeClr val="accent1"/>
                 </a:solidFill>
               </a14:hiddenFill>
             </a:ext>
             <a:ext uri="{91240B29-F687-4F45-9708-019B960494DF}">
-              <a14:hiddenLine xmlns:a14="http://schemas.microsoft.com/office/drawing/2010/main" w="9525">
+              <a14:hiddenLine xmlns="" xmlns:a14="http://schemas.microsoft.com/office/drawing/2010/main" w="9525">
                 <a:solidFill>
                   <a:schemeClr val="tx1"/>
                 </a:solidFill>
@@ -6712,7 +6795,7 @@
     </p:spTree>
     <p:extLst>
       <p:ext uri="{BB962C8B-B14F-4D97-AF65-F5344CB8AC3E}">
-        <p14:creationId xmlns:p14="http://schemas.microsoft.com/office/powerpoint/2010/main" val="1871850746"/>
+        <p14:creationId xmlns="" xmlns:p14="http://schemas.microsoft.com/office/powerpoint/2010/main" val="1871850746"/>
       </p:ext>
     </p:extLst>
   </p:cSld>
@@ -7078,7 +7161,7 @@
     </p:spTree>
     <p:extLst>
       <p:ext uri="{BB962C8B-B14F-4D97-AF65-F5344CB8AC3E}">
-        <p14:creationId xmlns:p14="http://schemas.microsoft.com/office/powerpoint/2010/main" val="2805868325"/>
+        <p14:creationId xmlns="" xmlns:p14="http://schemas.microsoft.com/office/powerpoint/2010/main" val="2805868325"/>
       </p:ext>
     </p:extLst>
   </p:cSld>
@@ -7425,7 +7508,7 @@
     </p:spTree>
     <p:extLst>
       <p:ext uri="{BB962C8B-B14F-4D97-AF65-F5344CB8AC3E}">
-        <p14:creationId xmlns:p14="http://schemas.microsoft.com/office/powerpoint/2010/main" val="4082097249"/>
+        <p14:creationId xmlns="" xmlns:p14="http://schemas.microsoft.com/office/powerpoint/2010/main" val="4082097249"/>
       </p:ext>
     </p:extLst>
   </p:cSld>
@@ -7623,10 +7706,10 @@
           <p:nvPr/>
         </p:nvPicPr>
         <p:blipFill>
-          <a:blip r:embed="rId3">
+          <a:blip r:embed="rId3" cstate="print">
             <a:extLst>
               <a:ext uri="{28A0092B-C50C-407E-A947-70E740481C1C}">
-                <a14:useLocalDpi xmlns:a14="http://schemas.microsoft.com/office/drawing/2010/main" val="0"/>
+                <a14:useLocalDpi xmlns="" xmlns:a14="http://schemas.microsoft.com/office/drawing/2010/main" val="0"/>
               </a:ext>
             </a:extLst>
           </a:blip>
@@ -7649,14 +7732,14 @@
           </a:ln>
           <a:extLst>
             <a:ext uri="{909E8E84-426E-40DD-AFC4-6F175D3DCCD1}">
-              <a14:hiddenFill xmlns:a14="http://schemas.microsoft.com/office/drawing/2010/main">
+              <a14:hiddenFill xmlns="" xmlns:a14="http://schemas.microsoft.com/office/drawing/2010/main">
                 <a:solidFill>
                   <a:schemeClr val="accent1"/>
                 </a:solidFill>
               </a14:hiddenFill>
             </a:ext>
             <a:ext uri="{91240B29-F687-4F45-9708-019B960494DF}">
-              <a14:hiddenLine xmlns:a14="http://schemas.microsoft.com/office/drawing/2010/main" w="9525">
+              <a14:hiddenLine xmlns="" xmlns:a14="http://schemas.microsoft.com/office/drawing/2010/main" w="9525">
                 <a:solidFill>
                   <a:schemeClr val="tx1"/>
                 </a:solidFill>
@@ -7677,10 +7760,10 @@
           <p:nvPr/>
         </p:nvPicPr>
         <p:blipFill>
-          <a:blip r:embed="rId4">
+          <a:blip r:embed="rId4" cstate="print">
             <a:extLst>
               <a:ext uri="{28A0092B-C50C-407E-A947-70E740481C1C}">
-                <a14:useLocalDpi xmlns:a14="http://schemas.microsoft.com/office/drawing/2010/main" val="0"/>
+                <a14:useLocalDpi xmlns="" xmlns:a14="http://schemas.microsoft.com/office/drawing/2010/main" val="0"/>
               </a:ext>
             </a:extLst>
           </a:blip>
@@ -7703,14 +7786,14 @@
           </a:ln>
           <a:extLst>
             <a:ext uri="{909E8E84-426E-40DD-AFC4-6F175D3DCCD1}">
-              <a14:hiddenFill xmlns:a14="http://schemas.microsoft.com/office/drawing/2010/main">
+              <a14:hiddenFill xmlns="" xmlns:a14="http://schemas.microsoft.com/office/drawing/2010/main">
                 <a:solidFill>
                   <a:schemeClr val="accent1"/>
                 </a:solidFill>
               </a14:hiddenFill>
             </a:ext>
             <a:ext uri="{91240B29-F687-4F45-9708-019B960494DF}">
-              <a14:hiddenLine xmlns:a14="http://schemas.microsoft.com/office/drawing/2010/main" w="9525">
+              <a14:hiddenLine xmlns="" xmlns:a14="http://schemas.microsoft.com/office/drawing/2010/main" w="9525">
                 <a:solidFill>
                   <a:schemeClr val="tx1"/>
                 </a:solidFill>
@@ -7731,10 +7814,10 @@
           <p:nvPr/>
         </p:nvPicPr>
         <p:blipFill>
-          <a:blip r:embed="rId5">
+          <a:blip r:embed="rId5" cstate="print">
             <a:extLst>
               <a:ext uri="{28A0092B-C50C-407E-A947-70E740481C1C}">
-                <a14:useLocalDpi xmlns:a14="http://schemas.microsoft.com/office/drawing/2010/main" val="0"/>
+                <a14:useLocalDpi xmlns="" xmlns:a14="http://schemas.microsoft.com/office/drawing/2010/main" val="0"/>
               </a:ext>
             </a:extLst>
           </a:blip>
@@ -7757,14 +7840,14 @@
           </a:ln>
           <a:extLst>
             <a:ext uri="{909E8E84-426E-40DD-AFC4-6F175D3DCCD1}">
-              <a14:hiddenFill xmlns:a14="http://schemas.microsoft.com/office/drawing/2010/main">
+              <a14:hiddenFill xmlns="" xmlns:a14="http://schemas.microsoft.com/office/drawing/2010/main">
                 <a:solidFill>
                   <a:schemeClr val="accent1"/>
                 </a:solidFill>
               </a14:hiddenFill>
             </a:ext>
             <a:ext uri="{91240B29-F687-4F45-9708-019B960494DF}">
-              <a14:hiddenLine xmlns:a14="http://schemas.microsoft.com/office/drawing/2010/main" w="9525">
+              <a14:hiddenLine xmlns="" xmlns:a14="http://schemas.microsoft.com/office/drawing/2010/main" w="9525">
                 <a:solidFill>
                   <a:schemeClr val="tx1"/>
                 </a:solidFill>
@@ -7785,10 +7868,10 @@
           <p:nvPr/>
         </p:nvPicPr>
         <p:blipFill>
-          <a:blip r:embed="rId6">
+          <a:blip r:embed="rId6" cstate="print">
             <a:extLst>
               <a:ext uri="{28A0092B-C50C-407E-A947-70E740481C1C}">
-                <a14:useLocalDpi xmlns:a14="http://schemas.microsoft.com/office/drawing/2010/main" val="0"/>
+                <a14:useLocalDpi xmlns="" xmlns:a14="http://schemas.microsoft.com/office/drawing/2010/main" val="0"/>
               </a:ext>
             </a:extLst>
           </a:blip>
@@ -7811,14 +7894,14 @@
           </a:ln>
           <a:extLst>
             <a:ext uri="{909E8E84-426E-40DD-AFC4-6F175D3DCCD1}">
-              <a14:hiddenFill xmlns:a14="http://schemas.microsoft.com/office/drawing/2010/main">
+              <a14:hiddenFill xmlns="" xmlns:a14="http://schemas.microsoft.com/office/drawing/2010/main">
                 <a:solidFill>
                   <a:schemeClr val="accent1"/>
                 </a:solidFill>
               </a14:hiddenFill>
             </a:ext>
             <a:ext uri="{91240B29-F687-4F45-9708-019B960494DF}">
-              <a14:hiddenLine xmlns:a14="http://schemas.microsoft.com/office/drawing/2010/main" w="9525">
+              <a14:hiddenLine xmlns="" xmlns:a14="http://schemas.microsoft.com/office/drawing/2010/main" w="9525">
                 <a:solidFill>
                   <a:schemeClr val="tx1"/>
                 </a:solidFill>
@@ -7839,10 +7922,10 @@
           <p:nvPr/>
         </p:nvPicPr>
         <p:blipFill>
-          <a:blip r:embed="rId7">
+          <a:blip r:embed="rId7" cstate="print">
             <a:extLst>
               <a:ext uri="{28A0092B-C50C-407E-A947-70E740481C1C}">
-                <a14:useLocalDpi xmlns:a14="http://schemas.microsoft.com/office/drawing/2010/main" val="0"/>
+                <a14:useLocalDpi xmlns="" xmlns:a14="http://schemas.microsoft.com/office/drawing/2010/main" val="0"/>
               </a:ext>
             </a:extLst>
           </a:blip>
@@ -7865,14 +7948,14 @@
           </a:ln>
           <a:extLst>
             <a:ext uri="{909E8E84-426E-40DD-AFC4-6F175D3DCCD1}">
-              <a14:hiddenFill xmlns:a14="http://schemas.microsoft.com/office/drawing/2010/main">
+              <a14:hiddenFill xmlns="" xmlns:a14="http://schemas.microsoft.com/office/drawing/2010/main">
                 <a:solidFill>
                   <a:schemeClr val="accent1"/>
                 </a:solidFill>
               </a14:hiddenFill>
             </a:ext>
             <a:ext uri="{91240B29-F687-4F45-9708-019B960494DF}">
-              <a14:hiddenLine xmlns:a14="http://schemas.microsoft.com/office/drawing/2010/main" w="9525">
+              <a14:hiddenLine xmlns="" xmlns:a14="http://schemas.microsoft.com/office/drawing/2010/main" w="9525">
                 <a:solidFill>
                   <a:schemeClr val="tx1"/>
                 </a:solidFill>
@@ -7887,7 +7970,7 @@
     </p:spTree>
     <p:extLst>
       <p:ext uri="{BB962C8B-B14F-4D97-AF65-F5344CB8AC3E}">
-        <p14:creationId xmlns:p14="http://schemas.microsoft.com/office/powerpoint/2010/main" val="2183030227"/>
+        <p14:creationId xmlns="" xmlns:p14="http://schemas.microsoft.com/office/powerpoint/2010/main" val="2183030227"/>
       </p:ext>
     </p:extLst>
   </p:cSld>
@@ -8291,10 +8374,10 @@
           <p:nvPr/>
         </p:nvPicPr>
         <p:blipFill>
-          <a:blip r:embed="rId3">
+          <a:blip r:embed="rId3" cstate="print">
             <a:extLst>
               <a:ext uri="{28A0092B-C50C-407E-A947-70E740481C1C}">
-                <a14:useLocalDpi xmlns:a14="http://schemas.microsoft.com/office/drawing/2010/main" val="0"/>
+                <a14:useLocalDpi xmlns="" xmlns:a14="http://schemas.microsoft.com/office/drawing/2010/main" val="0"/>
               </a:ext>
             </a:extLst>
           </a:blip>
@@ -8317,14 +8400,14 @@
           </a:ln>
           <a:extLst>
             <a:ext uri="{909E8E84-426E-40DD-AFC4-6F175D3DCCD1}">
-              <a14:hiddenFill xmlns:a14="http://schemas.microsoft.com/office/drawing/2010/main">
+              <a14:hiddenFill xmlns="" xmlns:a14="http://schemas.microsoft.com/office/drawing/2010/main">
                 <a:solidFill>
                   <a:schemeClr val="accent1"/>
                 </a:solidFill>
               </a14:hiddenFill>
             </a:ext>
             <a:ext uri="{91240B29-F687-4F45-9708-019B960494DF}">
-              <a14:hiddenLine xmlns:a14="http://schemas.microsoft.com/office/drawing/2010/main" w="9525">
+              <a14:hiddenLine xmlns="" xmlns:a14="http://schemas.microsoft.com/office/drawing/2010/main" w="9525">
                 <a:solidFill>
                   <a:schemeClr val="tx1"/>
                 </a:solidFill>
@@ -8345,10 +8428,10 @@
           <p:nvPr/>
         </p:nvPicPr>
         <p:blipFill>
-          <a:blip r:embed="rId4">
+          <a:blip r:embed="rId4" cstate="print">
             <a:extLst>
               <a:ext uri="{28A0092B-C50C-407E-A947-70E740481C1C}">
-                <a14:useLocalDpi xmlns:a14="http://schemas.microsoft.com/office/drawing/2010/main" val="0"/>
+                <a14:useLocalDpi xmlns="" xmlns:a14="http://schemas.microsoft.com/office/drawing/2010/main" val="0"/>
               </a:ext>
             </a:extLst>
           </a:blip>
@@ -8371,14 +8454,14 @@
           </a:ln>
           <a:extLst>
             <a:ext uri="{909E8E84-426E-40DD-AFC4-6F175D3DCCD1}">
-              <a14:hiddenFill xmlns:a14="http://schemas.microsoft.com/office/drawing/2010/main">
+              <a14:hiddenFill xmlns="" xmlns:a14="http://schemas.microsoft.com/office/drawing/2010/main">
                 <a:solidFill>
                   <a:schemeClr val="accent1"/>
                 </a:solidFill>
               </a14:hiddenFill>
             </a:ext>
             <a:ext uri="{91240B29-F687-4F45-9708-019B960494DF}">
-              <a14:hiddenLine xmlns:a14="http://schemas.microsoft.com/office/drawing/2010/main" w="9525">
+              <a14:hiddenLine xmlns="" xmlns:a14="http://schemas.microsoft.com/office/drawing/2010/main" w="9525">
                 <a:solidFill>
                   <a:schemeClr val="tx1"/>
                 </a:solidFill>
@@ -8485,7 +8568,7 @@
     </p:spTree>
     <p:extLst>
       <p:ext uri="{BB962C8B-B14F-4D97-AF65-F5344CB8AC3E}">
-        <p14:creationId xmlns:p14="http://schemas.microsoft.com/office/powerpoint/2010/main" val="1024381897"/>
+        <p14:creationId xmlns="" xmlns:p14="http://schemas.microsoft.com/office/powerpoint/2010/main" val="1024381897"/>
       </p:ext>
     </p:extLst>
   </p:cSld>
@@ -8529,24 +8612,19 @@
             <p:ph type="title"/>
           </p:nvPr>
         </p:nvSpPr>
-        <p:spPr>
-          <a:xfrm>
-            <a:off x="467544" y="188640"/>
-            <a:ext cx="8229600" cy="1143000"/>
-          </a:xfrm>
-        </p:spPr>
+        <p:spPr/>
         <p:txBody>
           <a:bodyPr/>
           <a:lstStyle/>
           <a:p>
             <a:pPr eaLnBrk="1" hangingPunct="1"/>
             <a:r>
-              <a:rPr lang="nl-BE" sz="4000" dirty="0">
+              <a:rPr lang="nl-BE" sz="4000" dirty="0" err="1" smtClean="0">
                 <a:solidFill>
                   <a:schemeClr val="bg1"/>
                 </a:solidFill>
               </a:rPr>
-              <a:t>e</a:t>
+              <a:t>MySensors</a:t>
             </a:r>
             <a:r>
               <a:rPr lang="nl-BE" sz="4000" dirty="0" smtClean="0">
@@ -8554,7 +8632,7 @@
                   <a:schemeClr val="bg1"/>
                 </a:solidFill>
               </a:rPr>
-              <a:t>2e </a:t>
+              <a:t> </a:t>
             </a:r>
             <a:r>
               <a:rPr lang="nl-BE" sz="4000" dirty="0" err="1" smtClean="0">
@@ -8562,7 +8640,7 @@
                   <a:schemeClr val="bg1"/>
                 </a:solidFill>
               </a:rPr>
-              <a:t>WSNatWork</a:t>
+              <a:t>Payload</a:t>
             </a:r>
             <a:r>
               <a:rPr lang="nl-BE" sz="4000" dirty="0" smtClean="0">
@@ -8570,8 +8648,21 @@
                   <a:schemeClr val="bg1"/>
                 </a:solidFill>
               </a:rPr>
-              <a:t> stack</a:t>
-            </a:r>
+              <a:t> </a:t>
+            </a:r>
+            <a:r>
+              <a:rPr lang="nl-BE" sz="4000" dirty="0" err="1" smtClean="0">
+                <a:solidFill>
+                  <a:schemeClr val="bg1"/>
+                </a:solidFill>
+              </a:rPr>
+              <a:t>Format</a:t>
+            </a:r>
+            <a:endParaRPr lang="nl-BE" sz="4000" dirty="0" smtClean="0">
+              <a:solidFill>
+                <a:schemeClr val="bg1"/>
+              </a:solidFill>
+            </a:endParaRPr>
           </a:p>
         </p:txBody>
       </p:sp>
@@ -8587,7 +8678,7 @@
         </p:nvSpPr>
         <p:spPr>
           <a:xfrm>
-            <a:off x="539552" y="1196752"/>
+            <a:off x="543132" y="1340768"/>
             <a:ext cx="8229600" cy="4525963"/>
           </a:xfrm>
         </p:spPr>
@@ -8595,181 +8686,906 @@
           <a:bodyPr/>
           <a:lstStyle/>
           <a:p>
-            <a:pPr lvl="1" eaLnBrk="1" hangingPunct="1">
+            <a:pPr marL="409575" lvl="1" eaLnBrk="1" hangingPunct="1">
               <a:buFontTx/>
               <a:buChar char="-"/>
+              <a:tabLst>
+                <a:tab pos="2743200" algn="l"/>
+              </a:tabLst>
             </a:pPr>
-            <a:endParaRPr lang="nl-BE" dirty="0" smtClean="0">
+            <a:r>
+              <a:rPr lang="nl-BE" sz="2000" dirty="0" err="1" smtClean="0">
+                <a:solidFill>
+                  <a:schemeClr val="accent3"/>
+                </a:solidFill>
+              </a:rPr>
+              <a:t>lastNode</a:t>
+            </a:r>
+            <a:r>
+              <a:rPr lang="nl-BE" sz="2000" dirty="0" smtClean="0">
+                <a:solidFill>
+                  <a:schemeClr val="accent3"/>
+                </a:solidFill>
+              </a:rPr>
+              <a:t>:8	last node </a:t>
+            </a:r>
+            <a:r>
+              <a:rPr lang="nl-BE" sz="2000" dirty="0" err="1" smtClean="0">
+                <a:solidFill>
+                  <a:schemeClr val="accent3"/>
+                </a:solidFill>
+              </a:rPr>
+              <a:t>this</a:t>
+            </a:r>
+            <a:r>
+              <a:rPr lang="nl-BE" sz="2000" dirty="0" smtClean="0">
+                <a:solidFill>
+                  <a:schemeClr val="accent3"/>
+                </a:solidFill>
+              </a:rPr>
+              <a:t> </a:t>
+            </a:r>
+            <a:r>
+              <a:rPr lang="nl-BE" sz="2000" dirty="0" err="1" smtClean="0">
+                <a:solidFill>
+                  <a:schemeClr val="accent3"/>
+                </a:solidFill>
+              </a:rPr>
+              <a:t>msg</a:t>
+            </a:r>
+            <a:r>
+              <a:rPr lang="nl-BE" sz="2000" dirty="0" smtClean="0">
+                <a:solidFill>
+                  <a:schemeClr val="accent3"/>
+                </a:solidFill>
+              </a:rPr>
+              <a:t> </a:t>
+            </a:r>
+            <a:r>
+              <a:rPr lang="nl-BE" sz="2000" dirty="0" err="1" smtClean="0">
+                <a:solidFill>
+                  <a:schemeClr val="accent3"/>
+                </a:solidFill>
+              </a:rPr>
+              <a:t>passed</a:t>
+            </a:r>
+            <a:endParaRPr lang="nl-BE" sz="2000" dirty="0" smtClean="0">
               <a:solidFill>
                 <a:schemeClr val="accent3"/>
               </a:solidFill>
             </a:endParaRPr>
           </a:p>
           <a:p>
-            <a:pPr lvl="1" eaLnBrk="1" hangingPunct="1">
+            <a:pPr marL="409575" lvl="1" eaLnBrk="1" hangingPunct="1">
               <a:buFontTx/>
               <a:buChar char="-"/>
+              <a:tabLst>
+                <a:tab pos="2743200" algn="l"/>
+              </a:tabLst>
             </a:pPr>
-            <a:endParaRPr lang="nl-BE" sz="2400" dirty="0" smtClean="0">
+            <a:r>
+              <a:rPr lang="nl-BE" sz="2000" dirty="0" err="1" smtClean="0">
+                <a:solidFill>
+                  <a:schemeClr val="accent3"/>
+                </a:solidFill>
+              </a:rPr>
+              <a:t>origNode</a:t>
+            </a:r>
+            <a:r>
+              <a:rPr lang="nl-BE" sz="2000" dirty="0" smtClean="0">
+                <a:solidFill>
+                  <a:schemeClr val="accent3"/>
+                </a:solidFill>
+              </a:rPr>
+              <a:t>:8	</a:t>
+            </a:r>
+            <a:r>
+              <a:rPr lang="nl-BE" sz="2000" dirty="0" err="1" smtClean="0">
+                <a:solidFill>
+                  <a:schemeClr val="accent3"/>
+                </a:solidFill>
+              </a:rPr>
+              <a:t>originating</a:t>
+            </a:r>
+            <a:r>
+              <a:rPr lang="nl-BE" sz="2000" dirty="0" smtClean="0">
+                <a:solidFill>
+                  <a:schemeClr val="accent3"/>
+                </a:solidFill>
+              </a:rPr>
+              <a:t> node of </a:t>
+            </a:r>
+            <a:r>
+              <a:rPr lang="nl-BE" sz="2000" dirty="0" err="1" smtClean="0">
+                <a:solidFill>
+                  <a:schemeClr val="accent3"/>
+                </a:solidFill>
+              </a:rPr>
+              <a:t>this</a:t>
+            </a:r>
+            <a:r>
+              <a:rPr lang="nl-BE" sz="2000" dirty="0" smtClean="0">
+                <a:solidFill>
+                  <a:schemeClr val="accent3"/>
+                </a:solidFill>
+              </a:rPr>
+              <a:t> </a:t>
+            </a:r>
+            <a:r>
+              <a:rPr lang="nl-BE" sz="2000" dirty="0" err="1" smtClean="0">
+                <a:solidFill>
+                  <a:schemeClr val="accent3"/>
+                </a:solidFill>
+              </a:rPr>
+              <a:t>msg</a:t>
+            </a:r>
+            <a:endParaRPr lang="nl-BE" sz="2000" dirty="0" smtClean="0">
               <a:solidFill>
                 <a:schemeClr val="accent3"/>
               </a:solidFill>
             </a:endParaRPr>
           </a:p>
-        </p:txBody>
-      </p:sp>
-      <p:pic>
-        <p:nvPicPr>
-          <p:cNvPr id="1026" name="Picture 2"/>
-          <p:cNvPicPr>
-            <a:picLocks noChangeAspect="1" noChangeArrowheads="1"/>
-          </p:cNvPicPr>
-          <p:nvPr/>
-        </p:nvPicPr>
-        <p:blipFill>
-          <a:blip r:embed="rId3">
-            <a:extLst>
-              <a:ext uri="{28A0092B-C50C-407E-A947-70E740481C1C}">
-                <a14:useLocalDpi xmlns:a14="http://schemas.microsoft.com/office/drawing/2010/main" val="0"/>
-              </a:ext>
-            </a:extLst>
-          </a:blip>
-          <a:srcRect/>
-          <a:stretch>
-            <a:fillRect/>
-          </a:stretch>
-        </p:blipFill>
-        <p:spPr bwMode="auto">
-          <a:xfrm>
-            <a:off x="755576" y="1484784"/>
-            <a:ext cx="7866068" cy="3744416"/>
-          </a:xfrm>
-          <a:prstGeom prst="rect">
-            <a:avLst/>
-          </a:prstGeom>
-          <a:noFill/>
-          <a:ln>
-            <a:noFill/>
-          </a:ln>
-          <a:extLst>
-            <a:ext uri="{909E8E84-426E-40DD-AFC4-6F175D3DCCD1}">
-              <a14:hiddenFill xmlns:a14="http://schemas.microsoft.com/office/drawing/2010/main">
-                <a:solidFill>
-                  <a:schemeClr val="accent1"/>
-                </a:solidFill>
-              </a14:hiddenFill>
-            </a:ext>
-            <a:ext uri="{91240B29-F687-4F45-9708-019B960494DF}">
-              <a14:hiddenLine xmlns:a14="http://schemas.microsoft.com/office/drawing/2010/main" w="9525">
-                <a:solidFill>
-                  <a:schemeClr val="tx1"/>
-                </a:solidFill>
-                <a:miter lim="800000"/>
-                <a:headEnd/>
-                <a:tailEnd/>
-              </a14:hiddenLine>
-            </a:ext>
-          </a:extLst>
-        </p:spPr>
-      </p:pic>
-      <p:sp>
-        <p:nvSpPr>
-          <p:cNvPr id="11" name="Ovaal 10"/>
-          <p:cNvSpPr/>
-          <p:nvPr/>
-        </p:nvSpPr>
-        <p:spPr>
-          <a:xfrm>
-            <a:off x="3779912" y="4905164"/>
-            <a:ext cx="1512168" cy="1044116"/>
-          </a:xfrm>
-          <a:prstGeom prst="ellipse">
-            <a:avLst/>
-          </a:prstGeom>
-          <a:solidFill>
-            <a:srgbClr val="FF0000"/>
-          </a:solidFill>
-        </p:spPr>
-        <p:style>
-          <a:lnRef idx="2">
-            <a:schemeClr val="accent1">
-              <a:shade val="50000"/>
-            </a:schemeClr>
-          </a:lnRef>
-          <a:fillRef idx="1">
-            <a:schemeClr val="accent1"/>
-          </a:fillRef>
-          <a:effectRef idx="0">
-            <a:schemeClr val="accent1"/>
-          </a:effectRef>
-          <a:fontRef idx="minor">
-            <a:schemeClr val="lt1"/>
-          </a:fontRef>
-        </p:style>
-        <p:txBody>
-          <a:bodyPr rtlCol="0" anchor="ctr"/>
-          <a:lstStyle/>
-          <a:p>
-            <a:pPr algn="ctr"/>
-            <a:r>
-              <a:rPr lang="nl-BE" dirty="0" err="1" smtClean="0"/>
-              <a:t>wired</a:t>
-            </a:r>
-            <a:endParaRPr lang="nl-NL" dirty="0"/>
-          </a:p>
-        </p:txBody>
-      </p:sp>
-      <p:sp>
-        <p:nvSpPr>
-          <p:cNvPr id="7" name="Ovaal 6"/>
-          <p:cNvSpPr/>
-          <p:nvPr/>
-        </p:nvSpPr>
-        <p:spPr>
-          <a:xfrm>
-            <a:off x="6372200" y="4905164"/>
-            <a:ext cx="1584176" cy="1044116"/>
-          </a:xfrm>
-          <a:prstGeom prst="ellipse">
-            <a:avLst/>
-          </a:prstGeom>
-          <a:solidFill>
-            <a:srgbClr val="FF0000"/>
-          </a:solidFill>
-        </p:spPr>
-        <p:style>
-          <a:lnRef idx="2">
-            <a:schemeClr val="accent1">
-              <a:shade val="50000"/>
-            </a:schemeClr>
-          </a:lnRef>
-          <a:fillRef idx="1">
-            <a:schemeClr val="accent1"/>
-          </a:fillRef>
-          <a:effectRef idx="0">
-            <a:schemeClr val="accent1"/>
-          </a:effectRef>
-          <a:fontRef idx="minor">
-            <a:schemeClr val="lt1"/>
-          </a:fontRef>
-        </p:style>
-        <p:txBody>
-          <a:bodyPr rtlCol="0" anchor="ctr"/>
-          <a:lstStyle/>
-          <a:p>
-            <a:pPr algn="ctr"/>
-            <a:r>
-              <a:rPr lang="nl-BE" dirty="0" smtClean="0"/>
-              <a:t>RF</a:t>
-            </a:r>
-            <a:endParaRPr lang="nl-NL" dirty="0"/>
+          <a:p>
+            <a:pPr marL="409575" lvl="1" eaLnBrk="1" hangingPunct="1">
+              <a:buFontTx/>
+              <a:buChar char="-"/>
+              <a:tabLst>
+                <a:tab pos="2743200" algn="l"/>
+              </a:tabLst>
+            </a:pPr>
+            <a:r>
+              <a:rPr lang="nl-BE" sz="2000" dirty="0" err="1" smtClean="0">
+                <a:solidFill>
+                  <a:schemeClr val="accent3"/>
+                </a:solidFill>
+              </a:rPr>
+              <a:t>destNode</a:t>
+            </a:r>
+            <a:r>
+              <a:rPr lang="nl-BE" sz="2000" dirty="0" smtClean="0">
+                <a:solidFill>
+                  <a:schemeClr val="accent3"/>
+                </a:solidFill>
+              </a:rPr>
+              <a:t>:8	</a:t>
+            </a:r>
+            <a:r>
+              <a:rPr lang="nl-BE" sz="2000" dirty="0" err="1" smtClean="0">
+                <a:solidFill>
+                  <a:schemeClr val="accent3"/>
+                </a:solidFill>
+              </a:rPr>
+              <a:t>destination</a:t>
+            </a:r>
+            <a:r>
+              <a:rPr lang="nl-BE" sz="2000" dirty="0" smtClean="0">
+                <a:solidFill>
+                  <a:schemeClr val="accent3"/>
+                </a:solidFill>
+              </a:rPr>
+              <a:t> node </a:t>
+            </a:r>
+            <a:r>
+              <a:rPr lang="nl-BE" sz="2000" dirty="0" err="1" smtClean="0">
+                <a:solidFill>
+                  <a:schemeClr val="accent3"/>
+                </a:solidFill>
+              </a:rPr>
+              <a:t>for</a:t>
+            </a:r>
+            <a:r>
+              <a:rPr lang="nl-BE" sz="2000" dirty="0" smtClean="0">
+                <a:solidFill>
+                  <a:schemeClr val="accent3"/>
+                </a:solidFill>
+              </a:rPr>
+              <a:t> </a:t>
+            </a:r>
+            <a:r>
+              <a:rPr lang="nl-BE" sz="2000" dirty="0" err="1" smtClean="0">
+                <a:solidFill>
+                  <a:schemeClr val="accent3"/>
+                </a:solidFill>
+              </a:rPr>
+              <a:t>this</a:t>
+            </a:r>
+            <a:r>
+              <a:rPr lang="nl-BE" sz="2000" dirty="0" smtClean="0">
+                <a:solidFill>
+                  <a:schemeClr val="accent3"/>
+                </a:solidFill>
+              </a:rPr>
+              <a:t> </a:t>
+            </a:r>
+            <a:r>
+              <a:rPr lang="nl-BE" sz="2000" dirty="0" err="1" smtClean="0">
+                <a:solidFill>
+                  <a:schemeClr val="accent3"/>
+                </a:solidFill>
+              </a:rPr>
+              <a:t>msg</a:t>
+            </a:r>
+            <a:endParaRPr lang="nl-BE" sz="2000" dirty="0" smtClean="0">
+              <a:solidFill>
+                <a:schemeClr val="accent3"/>
+              </a:solidFill>
+            </a:endParaRPr>
+          </a:p>
+          <a:p>
+            <a:pPr marL="409575" lvl="1" eaLnBrk="1" hangingPunct="1">
+              <a:buFontTx/>
+              <a:buChar char="-"/>
+              <a:tabLst>
+                <a:tab pos="2743200" algn="l"/>
+              </a:tabLst>
+            </a:pPr>
+            <a:r>
+              <a:rPr lang="nl-BE" sz="2000" dirty="0" err="1" smtClean="0">
+                <a:solidFill>
+                  <a:schemeClr val="accent3"/>
+                </a:solidFill>
+              </a:rPr>
+              <a:t>protocolVersion</a:t>
+            </a:r>
+            <a:r>
+              <a:rPr lang="nl-BE" sz="2000" dirty="0" smtClean="0">
+                <a:solidFill>
+                  <a:schemeClr val="accent3"/>
+                </a:solidFill>
+              </a:rPr>
+              <a:t>:3	</a:t>
+            </a:r>
+            <a:r>
+              <a:rPr lang="nl-BE" sz="2000" dirty="0" err="1" smtClean="0">
+                <a:solidFill>
+                  <a:schemeClr val="accent3"/>
+                </a:solidFill>
+              </a:rPr>
+              <a:t>version</a:t>
+            </a:r>
+            <a:r>
+              <a:rPr lang="nl-BE" sz="2000" dirty="0" smtClean="0">
+                <a:solidFill>
+                  <a:schemeClr val="accent3"/>
+                </a:solidFill>
+              </a:rPr>
+              <a:t> of </a:t>
+            </a:r>
+            <a:r>
+              <a:rPr lang="nl-BE" sz="2000" dirty="0" err="1" smtClean="0">
+                <a:solidFill>
+                  <a:schemeClr val="accent3"/>
+                </a:solidFill>
+              </a:rPr>
+              <a:t>mysensor</a:t>
+            </a:r>
+            <a:r>
+              <a:rPr lang="nl-BE" sz="2000" dirty="0" smtClean="0">
+                <a:solidFill>
+                  <a:schemeClr val="accent3"/>
+                </a:solidFill>
+              </a:rPr>
+              <a:t> protocol</a:t>
+            </a:r>
+          </a:p>
+          <a:p>
+            <a:pPr marL="409575" lvl="1" eaLnBrk="1" hangingPunct="1">
+              <a:buFontTx/>
+              <a:buChar char="-"/>
+              <a:tabLst>
+                <a:tab pos="2743200" algn="l"/>
+              </a:tabLst>
+            </a:pPr>
+            <a:r>
+              <a:rPr lang="nl-BE" sz="2000" dirty="0" err="1" smtClean="0">
+                <a:solidFill>
+                  <a:schemeClr val="accent3"/>
+                </a:solidFill>
+              </a:rPr>
+              <a:t>payloadLen</a:t>
+            </a:r>
+            <a:r>
+              <a:rPr lang="nl-BE" sz="2000" dirty="0" smtClean="0">
+                <a:solidFill>
+                  <a:schemeClr val="accent3"/>
+                </a:solidFill>
+              </a:rPr>
+              <a:t>:5	</a:t>
+            </a:r>
+            <a:r>
+              <a:rPr lang="nl-BE" sz="2000" dirty="0" err="1" smtClean="0">
+                <a:solidFill>
+                  <a:schemeClr val="accent3"/>
+                </a:solidFill>
+              </a:rPr>
+              <a:t>length</a:t>
+            </a:r>
+            <a:r>
+              <a:rPr lang="nl-BE" sz="2000" dirty="0" smtClean="0">
+                <a:solidFill>
+                  <a:schemeClr val="accent3"/>
+                </a:solidFill>
+              </a:rPr>
+              <a:t> of sensor </a:t>
+            </a:r>
+            <a:r>
+              <a:rPr lang="nl-BE" sz="2000" dirty="0" err="1" smtClean="0">
+                <a:solidFill>
+                  <a:schemeClr val="accent3"/>
+                </a:solidFill>
+              </a:rPr>
+              <a:t>payloadData</a:t>
+            </a:r>
+            <a:endParaRPr lang="nl-BE" sz="2000" dirty="0" smtClean="0">
+              <a:solidFill>
+                <a:schemeClr val="accent3"/>
+              </a:solidFill>
+            </a:endParaRPr>
+          </a:p>
+          <a:p>
+            <a:pPr marL="409575" lvl="1" eaLnBrk="1" hangingPunct="1">
+              <a:buFontTx/>
+              <a:buChar char="-"/>
+              <a:tabLst>
+                <a:tab pos="2743200" algn="l"/>
+              </a:tabLst>
+            </a:pPr>
+            <a:r>
+              <a:rPr lang="nl-BE" sz="2000" dirty="0" err="1" smtClean="0">
+                <a:solidFill>
+                  <a:schemeClr val="accent3"/>
+                </a:solidFill>
+              </a:rPr>
+              <a:t>msgType</a:t>
+            </a:r>
+            <a:r>
+              <a:rPr lang="nl-BE" sz="2000" dirty="0" smtClean="0">
+                <a:solidFill>
+                  <a:schemeClr val="accent3"/>
+                </a:solidFill>
+              </a:rPr>
+              <a:t>:3	</a:t>
+            </a:r>
+            <a:r>
+              <a:rPr lang="nl-BE" sz="2000" dirty="0" err="1" smtClean="0">
+                <a:solidFill>
+                  <a:schemeClr val="accent3"/>
+                </a:solidFill>
+              </a:rPr>
+              <a:t>presentation</a:t>
+            </a:r>
+            <a:r>
+              <a:rPr lang="nl-BE" sz="2000" dirty="0" smtClean="0">
+                <a:solidFill>
+                  <a:schemeClr val="accent3"/>
+                </a:solidFill>
+              </a:rPr>
+              <a:t>,set,</a:t>
+            </a:r>
+            <a:r>
+              <a:rPr lang="nl-BE" sz="2000" dirty="0" err="1" smtClean="0">
+                <a:solidFill>
+                  <a:schemeClr val="accent3"/>
+                </a:solidFill>
+              </a:rPr>
+              <a:t>req</a:t>
+            </a:r>
+            <a:r>
+              <a:rPr lang="nl-BE" sz="2000" dirty="0" smtClean="0">
+                <a:solidFill>
+                  <a:schemeClr val="accent3"/>
+                </a:solidFill>
+              </a:rPr>
+              <a:t>,</a:t>
+            </a:r>
+            <a:r>
+              <a:rPr lang="nl-BE" sz="2000" dirty="0" err="1" smtClean="0">
+                <a:solidFill>
+                  <a:schemeClr val="accent3"/>
+                </a:solidFill>
+              </a:rPr>
+              <a:t>internal</a:t>
+            </a:r>
+            <a:r>
+              <a:rPr lang="nl-BE" sz="2000" dirty="0" smtClean="0">
+                <a:solidFill>
+                  <a:schemeClr val="accent3"/>
+                </a:solidFill>
+              </a:rPr>
+              <a:t>,</a:t>
+            </a:r>
+            <a:r>
+              <a:rPr lang="nl-BE" sz="2000" dirty="0" err="1" smtClean="0">
+                <a:solidFill>
+                  <a:schemeClr val="accent3"/>
+                </a:solidFill>
+              </a:rPr>
+              <a:t>stream</a:t>
+            </a:r>
+            <a:endParaRPr lang="nl-BE" sz="2000" dirty="0" smtClean="0">
+              <a:solidFill>
+                <a:schemeClr val="accent3"/>
+              </a:solidFill>
+            </a:endParaRPr>
+          </a:p>
+          <a:p>
+            <a:pPr marL="409575" lvl="1" eaLnBrk="1" hangingPunct="1">
+              <a:buFontTx/>
+              <a:buChar char="-"/>
+              <a:tabLst>
+                <a:tab pos="2743200" algn="l"/>
+              </a:tabLst>
+            </a:pPr>
+            <a:r>
+              <a:rPr lang="nl-BE" sz="2000" dirty="0" err="1" smtClean="0">
+                <a:solidFill>
+                  <a:schemeClr val="accent3"/>
+                </a:solidFill>
+              </a:rPr>
+              <a:t>reqAck</a:t>
+            </a:r>
+            <a:r>
+              <a:rPr lang="nl-BE" sz="2000" dirty="0" smtClean="0">
+                <a:solidFill>
+                  <a:schemeClr val="accent3"/>
+                </a:solidFill>
+              </a:rPr>
+              <a:t>:1	</a:t>
+            </a:r>
+            <a:r>
+              <a:rPr lang="nl-BE" sz="2000" dirty="0" err="1" smtClean="0">
+                <a:solidFill>
+                  <a:schemeClr val="accent3"/>
+                </a:solidFill>
+              </a:rPr>
+              <a:t>request</a:t>
+            </a:r>
+            <a:r>
+              <a:rPr lang="nl-BE" sz="2000" dirty="0" smtClean="0">
+                <a:solidFill>
+                  <a:schemeClr val="accent3"/>
+                </a:solidFill>
+              </a:rPr>
+              <a:t> </a:t>
+            </a:r>
+            <a:r>
+              <a:rPr lang="nl-BE" sz="2000" dirty="0" err="1" smtClean="0">
+                <a:solidFill>
+                  <a:schemeClr val="accent3"/>
+                </a:solidFill>
+              </a:rPr>
+              <a:t>ack</a:t>
+            </a:r>
+            <a:r>
+              <a:rPr lang="nl-BE" sz="2000" dirty="0" smtClean="0">
+                <a:solidFill>
+                  <a:schemeClr val="accent3"/>
+                </a:solidFill>
+              </a:rPr>
+              <a:t> </a:t>
+            </a:r>
+            <a:r>
+              <a:rPr lang="nl-BE" sz="2000" dirty="0" err="1" smtClean="0">
+                <a:solidFill>
+                  <a:schemeClr val="accent3"/>
+                </a:solidFill>
+              </a:rPr>
+              <a:t>from</a:t>
+            </a:r>
+            <a:r>
+              <a:rPr lang="nl-BE" sz="2000" dirty="0" smtClean="0">
+                <a:solidFill>
+                  <a:schemeClr val="accent3"/>
+                </a:solidFill>
+              </a:rPr>
+              <a:t> </a:t>
+            </a:r>
+            <a:r>
+              <a:rPr lang="nl-BE" sz="2000" dirty="0" err="1" smtClean="0">
+                <a:solidFill>
+                  <a:schemeClr val="accent3"/>
+                </a:solidFill>
+              </a:rPr>
+              <a:t>destination</a:t>
+            </a:r>
+            <a:endParaRPr lang="nl-BE" sz="2000" dirty="0" smtClean="0">
+              <a:solidFill>
+                <a:schemeClr val="accent3"/>
+              </a:solidFill>
+            </a:endParaRPr>
+          </a:p>
+          <a:p>
+            <a:pPr marL="409575" lvl="1" eaLnBrk="1" hangingPunct="1">
+              <a:buFontTx/>
+              <a:buChar char="-"/>
+              <a:tabLst>
+                <a:tab pos="2743200" algn="l"/>
+              </a:tabLst>
+            </a:pPr>
+            <a:r>
+              <a:rPr lang="nl-BE" sz="2000" dirty="0" err="1" smtClean="0">
+                <a:solidFill>
+                  <a:schemeClr val="accent3"/>
+                </a:solidFill>
+              </a:rPr>
+              <a:t>isAck</a:t>
+            </a:r>
+            <a:r>
+              <a:rPr lang="nl-BE" sz="2000" dirty="0" smtClean="0">
+                <a:solidFill>
+                  <a:schemeClr val="accent3"/>
+                </a:solidFill>
+              </a:rPr>
+              <a:t>:1	</a:t>
+            </a:r>
+            <a:r>
+              <a:rPr lang="nl-BE" sz="2000" dirty="0" err="1" smtClean="0">
+                <a:solidFill>
+                  <a:schemeClr val="accent3"/>
+                </a:solidFill>
+              </a:rPr>
+              <a:t>msg</a:t>
+            </a:r>
+            <a:r>
+              <a:rPr lang="nl-BE" sz="2000" dirty="0" smtClean="0">
+                <a:solidFill>
+                  <a:schemeClr val="accent3"/>
+                </a:solidFill>
+              </a:rPr>
+              <a:t> </a:t>
+            </a:r>
+            <a:r>
+              <a:rPr lang="nl-BE" sz="2000" dirty="0" smtClean="0">
+                <a:solidFill>
+                  <a:schemeClr val="accent3"/>
+                </a:solidFill>
+              </a:rPr>
+              <a:t>is </a:t>
+            </a:r>
+            <a:r>
+              <a:rPr lang="nl-BE" sz="2000" dirty="0" err="1" smtClean="0">
+                <a:solidFill>
+                  <a:schemeClr val="accent3"/>
+                </a:solidFill>
+              </a:rPr>
+              <a:t>an</a:t>
+            </a:r>
+            <a:r>
+              <a:rPr lang="nl-BE" sz="2000" dirty="0" smtClean="0">
+                <a:solidFill>
+                  <a:schemeClr val="accent3"/>
+                </a:solidFill>
+              </a:rPr>
+              <a:t> </a:t>
+            </a:r>
+            <a:r>
+              <a:rPr lang="nl-BE" sz="2000" dirty="0" err="1" smtClean="0">
+                <a:solidFill>
+                  <a:schemeClr val="accent3"/>
+                </a:solidFill>
+              </a:rPr>
+              <a:t>ack</a:t>
+            </a:r>
+            <a:r>
+              <a:rPr lang="nl-BE" sz="2000" dirty="0" smtClean="0">
+                <a:solidFill>
+                  <a:schemeClr val="accent3"/>
+                </a:solidFill>
+              </a:rPr>
+              <a:t> </a:t>
+            </a:r>
+            <a:r>
+              <a:rPr lang="nl-BE" sz="2000" dirty="0" err="1" smtClean="0">
+                <a:solidFill>
+                  <a:schemeClr val="accent3"/>
+                </a:solidFill>
+              </a:rPr>
+              <a:t>from</a:t>
+            </a:r>
+            <a:r>
+              <a:rPr lang="nl-BE" sz="2000" dirty="0" smtClean="0">
+                <a:solidFill>
+                  <a:schemeClr val="accent3"/>
+                </a:solidFill>
+              </a:rPr>
+              <a:t> a </a:t>
+            </a:r>
+            <a:r>
+              <a:rPr lang="nl-BE" sz="2000" dirty="0" err="1" smtClean="0">
+                <a:solidFill>
+                  <a:schemeClr val="accent3"/>
+                </a:solidFill>
+              </a:rPr>
+              <a:t>destination</a:t>
+            </a:r>
+            <a:endParaRPr lang="nl-BE" sz="2000" dirty="0" smtClean="0">
+              <a:solidFill>
+                <a:schemeClr val="accent3"/>
+              </a:solidFill>
+            </a:endParaRPr>
+          </a:p>
+          <a:p>
+            <a:pPr marL="409575" lvl="1" eaLnBrk="1" hangingPunct="1">
+              <a:buFontTx/>
+              <a:buChar char="-"/>
+              <a:tabLst>
+                <a:tab pos="2743200" algn="l"/>
+              </a:tabLst>
+            </a:pPr>
+            <a:r>
+              <a:rPr lang="nl-BE" sz="2000" dirty="0" err="1" smtClean="0">
+                <a:solidFill>
+                  <a:schemeClr val="accent3"/>
+                </a:solidFill>
+              </a:rPr>
+              <a:t>payloadType</a:t>
+            </a:r>
+            <a:r>
+              <a:rPr lang="nl-BE" sz="2000" dirty="0" smtClean="0">
+                <a:solidFill>
+                  <a:schemeClr val="accent3"/>
+                </a:solidFill>
+              </a:rPr>
+              <a:t>:3	sensor </a:t>
+            </a:r>
+            <a:r>
+              <a:rPr lang="nl-BE" sz="2000" dirty="0" err="1" smtClean="0">
+                <a:solidFill>
+                  <a:schemeClr val="accent3"/>
+                </a:solidFill>
+              </a:rPr>
+              <a:t>payload</a:t>
+            </a:r>
+            <a:r>
+              <a:rPr lang="nl-BE" sz="2000" dirty="0" smtClean="0">
+                <a:solidFill>
+                  <a:schemeClr val="accent3"/>
+                </a:solidFill>
+              </a:rPr>
+              <a:t> data type (</a:t>
+            </a:r>
+            <a:r>
+              <a:rPr lang="nl-BE" sz="2000" dirty="0" err="1" smtClean="0">
+                <a:solidFill>
+                  <a:schemeClr val="accent3"/>
+                </a:solidFill>
+              </a:rPr>
+              <a:t>str</a:t>
+            </a:r>
+            <a:r>
+              <a:rPr lang="nl-BE" sz="2000" dirty="0" smtClean="0">
+                <a:solidFill>
+                  <a:schemeClr val="accent3"/>
+                </a:solidFill>
+              </a:rPr>
+              <a:t>, byte, 	int16,long32,</a:t>
+            </a:r>
+            <a:r>
+              <a:rPr lang="nl-BE" sz="2000" dirty="0" err="1" smtClean="0">
+                <a:solidFill>
+                  <a:schemeClr val="accent3"/>
+                </a:solidFill>
+              </a:rPr>
+              <a:t>custom</a:t>
+            </a:r>
+            <a:r>
+              <a:rPr lang="nl-BE" sz="2000" dirty="0" smtClean="0">
+                <a:solidFill>
+                  <a:schemeClr val="accent3"/>
+                </a:solidFill>
+              </a:rPr>
+              <a:t>,float32)</a:t>
+            </a:r>
+          </a:p>
+          <a:p>
+            <a:pPr marL="409575" lvl="1" eaLnBrk="1" hangingPunct="1">
+              <a:buFontTx/>
+              <a:buChar char="-"/>
+              <a:tabLst>
+                <a:tab pos="2743200" algn="l"/>
+              </a:tabLst>
+            </a:pPr>
+            <a:r>
+              <a:rPr lang="nl-BE" sz="2000" dirty="0" err="1" smtClean="0">
+                <a:solidFill>
+                  <a:schemeClr val="accent3"/>
+                </a:solidFill>
+              </a:rPr>
+              <a:t>subType</a:t>
+            </a:r>
+            <a:r>
+              <a:rPr lang="nl-BE" sz="2000" dirty="0" smtClean="0">
+                <a:solidFill>
+                  <a:schemeClr val="accent3"/>
+                </a:solidFill>
+              </a:rPr>
+              <a:t>:8	sensor </a:t>
+            </a:r>
+            <a:r>
+              <a:rPr lang="nl-BE" sz="2000" dirty="0" err="1" smtClean="0">
+                <a:solidFill>
+                  <a:schemeClr val="accent3"/>
+                </a:solidFill>
+              </a:rPr>
+              <a:t>sub-type</a:t>
+            </a:r>
+            <a:r>
+              <a:rPr lang="nl-BE" sz="2000" dirty="0" smtClean="0">
+                <a:solidFill>
+                  <a:schemeClr val="accent3"/>
+                </a:solidFill>
+              </a:rPr>
+              <a:t>, S_abc </a:t>
+            </a:r>
+            <a:r>
+              <a:rPr lang="nl-BE" sz="2000" dirty="0" err="1" smtClean="0">
+                <a:solidFill>
+                  <a:schemeClr val="accent3"/>
+                </a:solidFill>
+              </a:rPr>
+              <a:t>or</a:t>
+            </a:r>
+            <a:r>
+              <a:rPr lang="nl-BE" sz="2000" dirty="0" smtClean="0">
+                <a:solidFill>
+                  <a:schemeClr val="accent3"/>
+                </a:solidFill>
+              </a:rPr>
+              <a:t> V_abc</a:t>
+            </a:r>
+          </a:p>
+          <a:p>
+            <a:pPr marL="409575" lvl="1" eaLnBrk="1" hangingPunct="1">
+              <a:buFontTx/>
+              <a:buChar char="-"/>
+              <a:tabLst>
+                <a:tab pos="2743200" algn="l"/>
+              </a:tabLst>
+            </a:pPr>
+            <a:r>
+              <a:rPr lang="nl-BE" sz="2000" dirty="0" err="1" smtClean="0">
+                <a:solidFill>
+                  <a:schemeClr val="accent3"/>
+                </a:solidFill>
+              </a:rPr>
+              <a:t>sensorID</a:t>
+            </a:r>
+            <a:r>
+              <a:rPr lang="nl-BE" sz="2000" dirty="0" smtClean="0">
+                <a:solidFill>
+                  <a:schemeClr val="accent3"/>
+                </a:solidFill>
+              </a:rPr>
+              <a:t>:8	ID of sensor </a:t>
+            </a:r>
+            <a:r>
+              <a:rPr lang="nl-BE" sz="2000" dirty="0" err="1" smtClean="0">
+                <a:solidFill>
+                  <a:schemeClr val="accent3"/>
+                </a:solidFill>
+              </a:rPr>
+              <a:t>within</a:t>
+            </a:r>
+            <a:r>
+              <a:rPr lang="nl-BE" sz="2000" dirty="0" smtClean="0">
+                <a:solidFill>
+                  <a:schemeClr val="accent3"/>
+                </a:solidFill>
+              </a:rPr>
+              <a:t> </a:t>
+            </a:r>
+            <a:r>
+              <a:rPr lang="nl-BE" sz="2000" dirty="0" err="1" smtClean="0">
+                <a:solidFill>
+                  <a:schemeClr val="accent3"/>
+                </a:solidFill>
+              </a:rPr>
+              <a:t>this</a:t>
+            </a:r>
+            <a:r>
+              <a:rPr lang="nl-BE" sz="2000" dirty="0" smtClean="0">
+                <a:solidFill>
+                  <a:schemeClr val="accent3"/>
+                </a:solidFill>
+              </a:rPr>
+              <a:t> node</a:t>
+            </a:r>
+          </a:p>
+          <a:p>
+            <a:pPr marL="409575" lvl="1" eaLnBrk="1" hangingPunct="1">
+              <a:buFontTx/>
+              <a:buChar char="-"/>
+              <a:tabLst>
+                <a:tab pos="2743200" algn="l"/>
+              </a:tabLst>
+            </a:pPr>
+            <a:r>
+              <a:rPr lang="nl-BE" sz="2000" dirty="0" err="1" smtClean="0">
+                <a:solidFill>
+                  <a:schemeClr val="accent3"/>
+                </a:solidFill>
+              </a:rPr>
+              <a:t>payloadData</a:t>
+            </a:r>
+            <a:r>
+              <a:rPr lang="nl-BE" sz="2000" dirty="0" smtClean="0">
+                <a:solidFill>
+                  <a:schemeClr val="accent3"/>
+                </a:solidFill>
+              </a:rPr>
+              <a:t>	</a:t>
+            </a:r>
+            <a:r>
+              <a:rPr lang="nl-BE" sz="2000" dirty="0" err="1" smtClean="0">
+                <a:solidFill>
+                  <a:schemeClr val="accent3"/>
+                </a:solidFill>
+              </a:rPr>
+              <a:t>depending</a:t>
+            </a:r>
+            <a:r>
+              <a:rPr lang="nl-BE" sz="2000" dirty="0" smtClean="0">
+                <a:solidFill>
+                  <a:schemeClr val="accent3"/>
+                </a:solidFill>
+              </a:rPr>
+              <a:t> </a:t>
+            </a:r>
+            <a:r>
+              <a:rPr lang="nl-BE" sz="2000" dirty="0" err="1" smtClean="0">
+                <a:solidFill>
+                  <a:schemeClr val="accent3"/>
+                </a:solidFill>
+              </a:rPr>
+              <a:t>on</a:t>
+            </a:r>
+            <a:r>
+              <a:rPr lang="nl-BE" sz="2000" dirty="0" smtClean="0">
+                <a:solidFill>
+                  <a:schemeClr val="accent3"/>
+                </a:solidFill>
+              </a:rPr>
+              <a:t> </a:t>
+            </a:r>
+            <a:r>
+              <a:rPr lang="nl-BE" sz="2000" dirty="0" err="1" smtClean="0">
+                <a:solidFill>
+                  <a:schemeClr val="accent3"/>
+                </a:solidFill>
+              </a:rPr>
+              <a:t>payloadType</a:t>
+            </a:r>
+            <a:r>
+              <a:rPr lang="nl-BE" sz="2000" dirty="0" smtClean="0">
+                <a:solidFill>
+                  <a:schemeClr val="accent3"/>
+                </a:solidFill>
+              </a:rPr>
+              <a:t> (</a:t>
+            </a:r>
+            <a:r>
+              <a:rPr lang="nl-BE" sz="2000" dirty="0" err="1" smtClean="0">
+                <a:solidFill>
+                  <a:schemeClr val="accent3"/>
+                </a:solidFill>
+              </a:rPr>
+              <a:t>max</a:t>
+            </a:r>
+            <a:r>
+              <a:rPr lang="nl-BE" sz="2000" dirty="0" smtClean="0">
+                <a:solidFill>
+                  <a:schemeClr val="accent3"/>
+                </a:solidFill>
+              </a:rPr>
+              <a:t> 25 bytes)</a:t>
+            </a:r>
           </a:p>
         </p:txBody>
       </p:sp>
     </p:spTree>
     <p:extLst>
       <p:ext uri="{BB962C8B-B14F-4D97-AF65-F5344CB8AC3E}">
-        <p14:creationId xmlns:p14="http://schemas.microsoft.com/office/powerpoint/2010/main" val="2288650563"/>
+        <p14:creationId xmlns="" xmlns:p14="http://schemas.microsoft.com/office/powerpoint/2010/main" val="1024381897"/>
       </p:ext>
     </p:extLst>
   </p:cSld>
@@ -8813,19 +9629,40 @@
             <p:ph type="title"/>
           </p:nvPr>
         </p:nvSpPr>
-        <p:spPr/>
+        <p:spPr>
+          <a:xfrm>
+            <a:off x="467544" y="188640"/>
+            <a:ext cx="8229600" cy="1143000"/>
+          </a:xfrm>
+        </p:spPr>
         <p:txBody>
           <a:bodyPr/>
           <a:lstStyle/>
           <a:p>
             <a:pPr eaLnBrk="1" hangingPunct="1"/>
             <a:r>
+              <a:rPr lang="nl-BE" sz="4000" dirty="0">
+                <a:solidFill>
+                  <a:schemeClr val="bg1"/>
+                </a:solidFill>
+              </a:rPr>
+              <a:t>e</a:t>
+            </a:r>
+            <a:r>
+              <a:rPr lang="nl-BE" sz="4000" dirty="0" smtClean="0">
+                <a:solidFill>
+                  <a:schemeClr val="bg1"/>
+                </a:solidFill>
+              </a:rPr>
+              <a:t>2e </a:t>
+            </a:r>
+            <a:r>
               <a:rPr lang="nl-BE" sz="4000" dirty="0" err="1" smtClean="0">
                 <a:solidFill>
                   <a:schemeClr val="bg1"/>
                 </a:solidFill>
               </a:rPr>
-              <a:t>Packet</a:t>
+              <a:t>WSNatWork</a:t>
             </a:r>
             <a:r>
               <a:rPr lang="nl-BE" sz="4000" dirty="0" smtClean="0">
@@ -8833,23 +9670,7 @@
                   <a:schemeClr val="bg1"/>
                 </a:solidFill>
               </a:rPr>
-              <a:t> Walk : </a:t>
-            </a:r>
-            <a:r>
-              <a:rPr lang="nl-BE" sz="4000" dirty="0">
-                <a:solidFill>
-                  <a:schemeClr val="bg1"/>
-                </a:solidFill>
-              </a:rPr>
-              <a:t>n</a:t>
-            </a:r>
-            <a:r>
-              <a:rPr lang="nl-BE" sz="4000" dirty="0" smtClean="0">
-                <a:solidFill>
-                  <a:schemeClr val="bg1"/>
-                </a:solidFill>
-              </a:rPr>
-              <a:t>ode debug</a:t>
+              <a:t> stack</a:t>
             </a:r>
           </a:p>
         </p:txBody>
@@ -8866,7 +9687,7 @@
         </p:nvSpPr>
         <p:spPr>
           <a:xfrm>
-            <a:off x="539552" y="1484784"/>
+            <a:off x="539552" y="1196752"/>
             <a:ext cx="8229600" cy="4525963"/>
           </a:xfrm>
         </p:spPr>
@@ -8878,229 +9699,38 @@
               <a:buFontTx/>
               <a:buChar char="-"/>
             </a:pPr>
-            <a:r>
-              <a:rPr lang="nl-BE" sz="2400" dirty="0" err="1" smtClean="0">
-                <a:solidFill>
-                  <a:schemeClr val="accent3"/>
-                </a:solidFill>
-              </a:rPr>
-              <a:t>MyConfig.h</a:t>
-            </a:r>
-            <a:r>
-              <a:rPr lang="nl-BE" sz="2400" dirty="0" smtClean="0">
-                <a:solidFill>
-                  <a:schemeClr val="accent3"/>
-                </a:solidFill>
-              </a:rPr>
-              <a:t> (SERIAL DEBUG) </a:t>
-            </a:r>
-          </a:p>
-          <a:p>
-            <a:pPr lvl="2" eaLnBrk="1" hangingPunct="1">
-              <a:buFontTx/>
-              <a:buChar char="-"/>
-            </a:pPr>
-            <a:r>
-              <a:rPr lang="nl-BE" sz="2000" dirty="0" err="1" smtClean="0">
-                <a:solidFill>
-                  <a:schemeClr val="accent3"/>
-                </a:solidFill>
-              </a:rPr>
-              <a:t>Disable</a:t>
-            </a:r>
-            <a:r>
-              <a:rPr lang="nl-BE" sz="2000" dirty="0" smtClean="0">
-                <a:solidFill>
-                  <a:schemeClr val="accent3"/>
-                </a:solidFill>
-              </a:rPr>
-              <a:t> = 6% extra flash !</a:t>
-            </a:r>
+            <a:endParaRPr lang="nl-BE" dirty="0" smtClean="0">
+              <a:solidFill>
+                <a:schemeClr val="accent3"/>
+              </a:solidFill>
+            </a:endParaRPr>
           </a:p>
           <a:p>
             <a:pPr lvl="1" eaLnBrk="1" hangingPunct="1">
               <a:buFontTx/>
               <a:buChar char="-"/>
             </a:pPr>
-            <a:r>
-              <a:rPr lang="nl-BE" sz="2400" dirty="0" err="1" smtClean="0">
-                <a:solidFill>
-                  <a:schemeClr val="accent3"/>
-                </a:solidFill>
-              </a:rPr>
-              <a:t>MYScontroller</a:t>
-            </a:r>
-            <a:r>
-              <a:rPr lang="nl-BE" sz="2400" dirty="0" smtClean="0">
-                <a:solidFill>
-                  <a:schemeClr val="accent3"/>
-                </a:solidFill>
-              </a:rPr>
-              <a:t> (demo)  !!  </a:t>
-            </a:r>
-            <a:r>
-              <a:rPr lang="nl-BE" sz="2400" dirty="0">
-                <a:solidFill>
-                  <a:schemeClr val="accent3"/>
-                </a:solidFill>
-              </a:rPr>
-              <a:t>g</a:t>
-            </a:r>
-            <a:r>
-              <a:rPr lang="nl-BE" sz="2400" dirty="0" smtClean="0">
-                <a:solidFill>
-                  <a:schemeClr val="accent3"/>
-                </a:solidFill>
-              </a:rPr>
-              <a:t>ateway </a:t>
-            </a:r>
-            <a:r>
-              <a:rPr lang="nl-BE" sz="2400" dirty="0" err="1" smtClean="0">
-                <a:solidFill>
-                  <a:schemeClr val="accent3"/>
-                </a:solidFill>
-              </a:rPr>
-              <a:t>interaction</a:t>
-            </a:r>
-            <a:r>
-              <a:rPr lang="nl-BE" sz="2400" dirty="0" smtClean="0">
-                <a:solidFill>
-                  <a:schemeClr val="accent3"/>
-                </a:solidFill>
-              </a:rPr>
-              <a:t> !!</a:t>
-            </a:r>
-          </a:p>
-          <a:p>
-            <a:pPr lvl="2" eaLnBrk="1" hangingPunct="1">
-              <a:buFontTx/>
-              <a:buChar char="-"/>
-            </a:pPr>
-            <a:r>
-              <a:rPr lang="nl-BE" sz="2000" dirty="0">
-                <a:solidFill>
-                  <a:schemeClr val="accent3"/>
-                </a:solidFill>
-                <a:hlinkClick r:id="rId3"/>
-              </a:rPr>
-              <a:t>http://</a:t>
-            </a:r>
-            <a:r>
-              <a:rPr lang="nl-BE" sz="2000" dirty="0" smtClean="0">
-                <a:solidFill>
-                  <a:schemeClr val="accent3"/>
-                </a:solidFill>
-                <a:hlinkClick r:id="rId3"/>
-              </a:rPr>
-              <a:t>www.mysensors.org/controller/myscontroller</a:t>
-            </a:r>
-            <a:endParaRPr lang="nl-BE" sz="2000" dirty="0" smtClean="0">
+            <a:endParaRPr lang="nl-BE" sz="2400" dirty="0" smtClean="0">
               <a:solidFill>
                 <a:schemeClr val="accent3"/>
               </a:solidFill>
             </a:endParaRPr>
           </a:p>
-          <a:p>
-            <a:pPr lvl="1" eaLnBrk="1" hangingPunct="1">
-              <a:buFontTx/>
-              <a:buChar char="-"/>
-            </a:pPr>
-            <a:r>
-              <a:rPr lang="nl-BE" sz="2400" dirty="0" smtClean="0">
-                <a:solidFill>
-                  <a:schemeClr val="accent3"/>
-                </a:solidFill>
-              </a:rPr>
-              <a:t>NRF24 </a:t>
-            </a:r>
-            <a:r>
-              <a:rPr lang="nl-BE" sz="2400" dirty="0" err="1" smtClean="0">
-                <a:solidFill>
-                  <a:schemeClr val="accent3"/>
-                </a:solidFill>
-              </a:rPr>
-              <a:t>sniffer</a:t>
-            </a:r>
-            <a:r>
-              <a:rPr lang="nl-BE" sz="2400" dirty="0" smtClean="0">
-                <a:solidFill>
-                  <a:schemeClr val="accent3"/>
-                </a:solidFill>
-              </a:rPr>
-              <a:t> (demo : </a:t>
-            </a:r>
-            <a:r>
-              <a:rPr lang="nl-BE" sz="2400" dirty="0" err="1" smtClean="0">
-                <a:solidFill>
-                  <a:schemeClr val="accent3"/>
-                </a:solidFill>
-              </a:rPr>
-              <a:t>see</a:t>
-            </a:r>
-            <a:r>
-              <a:rPr lang="nl-BE" sz="2400" dirty="0" smtClean="0">
-                <a:solidFill>
-                  <a:schemeClr val="accent3"/>
-                </a:solidFill>
-              </a:rPr>
-              <a:t> next slide) </a:t>
-            </a:r>
-          </a:p>
-          <a:p>
-            <a:pPr lvl="2" eaLnBrk="1" hangingPunct="1">
-              <a:buFontTx/>
-              <a:buChar char="-"/>
-            </a:pPr>
-            <a:r>
-              <a:rPr lang="nl-BE" sz="2000" dirty="0">
-                <a:solidFill>
-                  <a:schemeClr val="accent3"/>
-                </a:solidFill>
-                <a:hlinkClick r:id="rId4"/>
-              </a:rPr>
-              <a:t>http://</a:t>
-            </a:r>
-            <a:r>
-              <a:rPr lang="nl-BE" sz="2000" dirty="0" smtClean="0">
-                <a:solidFill>
-                  <a:schemeClr val="accent3"/>
-                </a:solidFill>
-                <a:hlinkClick r:id="rId4"/>
-              </a:rPr>
-              <a:t>forum.mysensors.org/topic/242/wireless-nrf24l01-sniffer-for-mysensors</a:t>
-            </a:r>
-            <a:endParaRPr lang="nl-BE" sz="2000" dirty="0" smtClean="0">
-              <a:solidFill>
-                <a:schemeClr val="accent3"/>
-              </a:solidFill>
-            </a:endParaRPr>
-          </a:p>
-          <a:p>
-            <a:pPr lvl="2" eaLnBrk="1" hangingPunct="1">
-              <a:buFontTx/>
-              <a:buChar char="-"/>
-            </a:pPr>
-            <a:endParaRPr lang="nl-BE" sz="2000" dirty="0" smtClean="0">
-              <a:solidFill>
-                <a:schemeClr val="accent3"/>
-              </a:solidFill>
-            </a:endParaRPr>
-          </a:p>
         </p:txBody>
       </p:sp>
       <p:pic>
         <p:nvPicPr>
-          <p:cNvPr id="4098" name="Picture 2"/>
+          <p:cNvPr id="1026" name="Picture 2"/>
           <p:cNvPicPr>
             <a:picLocks noChangeAspect="1" noChangeArrowheads="1"/>
           </p:cNvPicPr>
           <p:nvPr/>
         </p:nvPicPr>
         <p:blipFill>
-          <a:blip r:embed="rId5">
+          <a:blip r:embed="rId3" cstate="print">
             <a:extLst>
               <a:ext uri="{28A0092B-C50C-407E-A947-70E740481C1C}">
-                <a14:useLocalDpi xmlns:a14="http://schemas.microsoft.com/office/drawing/2010/main" val="0"/>
+                <a14:useLocalDpi xmlns="" xmlns:a14="http://schemas.microsoft.com/office/drawing/2010/main" val="0"/>
               </a:ext>
             </a:extLst>
           </a:blip>
@@ -9111,8 +9741,8 @@
         </p:blipFill>
         <p:spPr bwMode="auto">
           <a:xfrm>
-            <a:off x="1642517" y="4509120"/>
-            <a:ext cx="6124575" cy="276225"/>
+            <a:off x="755576" y="1484784"/>
+            <a:ext cx="7866068" cy="3744416"/>
           </a:xfrm>
           <a:prstGeom prst="rect">
             <a:avLst/>
@@ -9123,14 +9753,14 @@
           </a:ln>
           <a:extLst>
             <a:ext uri="{909E8E84-426E-40DD-AFC4-6F175D3DCCD1}">
-              <a14:hiddenFill xmlns:a14="http://schemas.microsoft.com/office/drawing/2010/main">
+              <a14:hiddenFill xmlns="" xmlns:a14="http://schemas.microsoft.com/office/drawing/2010/main">
                 <a:solidFill>
                   <a:schemeClr val="accent1"/>
                 </a:solidFill>
               </a14:hiddenFill>
             </a:ext>
             <a:ext uri="{91240B29-F687-4F45-9708-019B960494DF}">
-              <a14:hiddenLine xmlns:a14="http://schemas.microsoft.com/office/drawing/2010/main" w="9525">
+              <a14:hiddenLine xmlns="" xmlns:a14="http://schemas.microsoft.com/office/drawing/2010/main" w="9525">
                 <a:solidFill>
                   <a:schemeClr val="tx1"/>
                 </a:solidFill>
@@ -9142,64 +9772,104 @@
           </a:extLst>
         </p:spPr>
       </p:pic>
-      <p:pic>
-        <p:nvPicPr>
-          <p:cNvPr id="4099" name="Picture 3"/>
-          <p:cNvPicPr>
-            <a:picLocks noChangeAspect="1" noChangeArrowheads="1"/>
-          </p:cNvPicPr>
-          <p:nvPr/>
-        </p:nvPicPr>
-        <p:blipFill>
-          <a:blip r:embed="rId6">
-            <a:extLst>
-              <a:ext uri="{28A0092B-C50C-407E-A947-70E740481C1C}">
-                <a14:useLocalDpi xmlns:a14="http://schemas.microsoft.com/office/drawing/2010/main" val="0"/>
-              </a:ext>
-            </a:extLst>
-          </a:blip>
-          <a:srcRect/>
-          <a:stretch>
-            <a:fillRect/>
-          </a:stretch>
-        </p:blipFill>
-        <p:spPr bwMode="auto">
-          <a:xfrm>
-            <a:off x="1619672" y="5157192"/>
-            <a:ext cx="6124575" cy="276225"/>
-          </a:xfrm>
-          <a:prstGeom prst="rect">
-            <a:avLst/>
-          </a:prstGeom>
-          <a:noFill/>
-          <a:ln>
-            <a:noFill/>
-          </a:ln>
-          <a:extLst>
-            <a:ext uri="{909E8E84-426E-40DD-AFC4-6F175D3DCCD1}">
-              <a14:hiddenFill xmlns:a14="http://schemas.microsoft.com/office/drawing/2010/main">
-                <a:solidFill>
-                  <a:schemeClr val="accent1"/>
-                </a:solidFill>
-              </a14:hiddenFill>
-            </a:ext>
-            <a:ext uri="{91240B29-F687-4F45-9708-019B960494DF}">
-              <a14:hiddenLine xmlns:a14="http://schemas.microsoft.com/office/drawing/2010/main" w="9525">
-                <a:solidFill>
-                  <a:schemeClr val="tx1"/>
-                </a:solidFill>
-                <a:miter lim="800000"/>
-                <a:headEnd/>
-                <a:tailEnd/>
-              </a14:hiddenLine>
-            </a:ext>
-          </a:extLst>
-        </p:spPr>
-      </p:pic>
+      <p:sp>
+        <p:nvSpPr>
+          <p:cNvPr id="11" name="Ovaal 10"/>
+          <p:cNvSpPr/>
+          <p:nvPr/>
+        </p:nvSpPr>
+        <p:spPr>
+          <a:xfrm>
+            <a:off x="3779912" y="4905164"/>
+            <a:ext cx="1512168" cy="1044116"/>
+          </a:xfrm>
+          <a:prstGeom prst="ellipse">
+            <a:avLst/>
+          </a:prstGeom>
+          <a:solidFill>
+            <a:srgbClr val="FF0000"/>
+          </a:solidFill>
+        </p:spPr>
+        <p:style>
+          <a:lnRef idx="2">
+            <a:schemeClr val="accent1">
+              <a:shade val="50000"/>
+            </a:schemeClr>
+          </a:lnRef>
+          <a:fillRef idx="1">
+            <a:schemeClr val="accent1"/>
+          </a:fillRef>
+          <a:effectRef idx="0">
+            <a:schemeClr val="accent1"/>
+          </a:effectRef>
+          <a:fontRef idx="minor">
+            <a:schemeClr val="lt1"/>
+          </a:fontRef>
+        </p:style>
+        <p:txBody>
+          <a:bodyPr rtlCol="0" anchor="ctr"/>
+          <a:lstStyle/>
+          <a:p>
+            <a:pPr algn="ctr"/>
+            <a:r>
+              <a:rPr lang="nl-BE" dirty="0" err="1" smtClean="0"/>
+              <a:t>wired</a:t>
+            </a:r>
+            <a:endParaRPr lang="nl-NL" dirty="0"/>
+          </a:p>
+        </p:txBody>
+      </p:sp>
+      <p:sp>
+        <p:nvSpPr>
+          <p:cNvPr id="7" name="Ovaal 6"/>
+          <p:cNvSpPr/>
+          <p:nvPr/>
+        </p:nvSpPr>
+        <p:spPr>
+          <a:xfrm>
+            <a:off x="6372200" y="4905164"/>
+            <a:ext cx="1584176" cy="1044116"/>
+          </a:xfrm>
+          <a:prstGeom prst="ellipse">
+            <a:avLst/>
+          </a:prstGeom>
+          <a:solidFill>
+            <a:srgbClr val="FF0000"/>
+          </a:solidFill>
+        </p:spPr>
+        <p:style>
+          <a:lnRef idx="2">
+            <a:schemeClr val="accent1">
+              <a:shade val="50000"/>
+            </a:schemeClr>
+          </a:lnRef>
+          <a:fillRef idx="1">
+            <a:schemeClr val="accent1"/>
+          </a:fillRef>
+          <a:effectRef idx="0">
+            <a:schemeClr val="accent1"/>
+          </a:effectRef>
+          <a:fontRef idx="minor">
+            <a:schemeClr val="lt1"/>
+          </a:fontRef>
+        </p:style>
+        <p:txBody>
+          <a:bodyPr rtlCol="0" anchor="ctr"/>
+          <a:lstStyle/>
+          <a:p>
+            <a:pPr algn="ctr"/>
+            <a:r>
+              <a:rPr lang="nl-BE" dirty="0" smtClean="0"/>
+              <a:t>RF</a:t>
+            </a:r>
+            <a:endParaRPr lang="nl-NL" dirty="0"/>
+          </a:p>
+        </p:txBody>
+      </p:sp>
     </p:spTree>
     <p:extLst>
       <p:ext uri="{BB962C8B-B14F-4D97-AF65-F5344CB8AC3E}">
-        <p14:creationId xmlns:p14="http://schemas.microsoft.com/office/powerpoint/2010/main" val="2402787109"/>
+        <p14:creationId xmlns="" xmlns:p14="http://schemas.microsoft.com/office/powerpoint/2010/main" val="2288650563"/>
       </p:ext>
     </p:extLst>
   </p:cSld>
@@ -9250,20 +9920,28 @@
           <a:p>
             <a:pPr eaLnBrk="1" hangingPunct="1"/>
             <a:r>
+              <a:rPr lang="nl-BE" sz="4000" dirty="0" err="1" smtClean="0">
+                <a:solidFill>
+                  <a:schemeClr val="bg1"/>
+                </a:solidFill>
+              </a:rPr>
+              <a:t>Packet</a:t>
+            </a:r>
+            <a:r>
               <a:rPr lang="nl-BE" sz="4000" dirty="0" smtClean="0">
                 <a:solidFill>
                   <a:schemeClr val="bg1"/>
                 </a:solidFill>
               </a:rPr>
-              <a:t>LED node : </a:t>
-            </a:r>
-            <a:r>
-              <a:rPr lang="nl-BE" sz="4000" dirty="0" err="1" smtClean="0">
+              <a:t> Walk : </a:t>
+            </a:r>
+            <a:r>
+              <a:rPr lang="nl-BE" sz="4000" dirty="0">
                 <a:solidFill>
                   <a:schemeClr val="bg1"/>
                 </a:solidFill>
               </a:rPr>
-              <a:t>wireshark</a:t>
+              <a:t>n</a:t>
             </a:r>
             <a:r>
               <a:rPr lang="nl-BE" sz="4000" dirty="0" smtClean="0">
@@ -9271,37 +9949,258 @@
                   <a:schemeClr val="bg1"/>
                 </a:solidFill>
               </a:rPr>
-              <a:t> air </a:t>
-            </a:r>
-            <a:r>
-              <a:rPr lang="nl-BE" sz="4000" dirty="0" err="1" smtClean="0">
-                <a:solidFill>
-                  <a:schemeClr val="bg1"/>
-                </a:solidFill>
-              </a:rPr>
-              <a:t>capture</a:t>
-            </a:r>
-            <a:endParaRPr lang="nl-BE" sz="4000" dirty="0" smtClean="0">
+              <a:t>ode debug</a:t>
+            </a:r>
+          </a:p>
+        </p:txBody>
+      </p:sp>
+      <p:sp>
+        <p:nvSpPr>
+          <p:cNvPr id="5123" name="Content Placeholder 2"/>
+          <p:cNvSpPr>
+            <a:spLocks noGrp="1"/>
+          </p:cNvSpPr>
+          <p:nvPr>
+            <p:ph idx="1"/>
+          </p:nvPr>
+        </p:nvSpPr>
+        <p:spPr>
+          <a:xfrm>
+            <a:off x="539552" y="1484784"/>
+            <a:ext cx="8229600" cy="4525963"/>
+          </a:xfrm>
+        </p:spPr>
+        <p:txBody>
+          <a:bodyPr/>
+          <a:lstStyle/>
+          <a:p>
+            <a:pPr lvl="1" eaLnBrk="1" hangingPunct="1">
+              <a:buFontTx/>
+              <a:buChar char="-"/>
+            </a:pPr>
+            <a:r>
+              <a:rPr lang="nl-BE" sz="2400" dirty="0" err="1" smtClean="0">
+                <a:solidFill>
+                  <a:schemeClr val="accent3"/>
+                </a:solidFill>
+              </a:rPr>
+              <a:t>MyConfig.h</a:t>
+            </a:r>
+            <a:r>
+              <a:rPr lang="nl-BE" sz="2400" dirty="0" smtClean="0">
+                <a:solidFill>
+                  <a:schemeClr val="accent3"/>
+                </a:solidFill>
+              </a:rPr>
+              <a:t> (SERIAL DEBUG) </a:t>
+            </a:r>
+          </a:p>
+          <a:p>
+            <a:pPr lvl="2" eaLnBrk="1" hangingPunct="1">
+              <a:buFontTx/>
+              <a:buChar char="-"/>
+            </a:pPr>
+            <a:r>
+              <a:rPr lang="nl-BE" sz="2000" dirty="0" err="1" smtClean="0">
+                <a:solidFill>
+                  <a:schemeClr val="accent3"/>
+                </a:solidFill>
+              </a:rPr>
+              <a:t>Disable</a:t>
+            </a:r>
+            <a:r>
+              <a:rPr lang="nl-BE" sz="2000" dirty="0" smtClean="0">
+                <a:solidFill>
+                  <a:schemeClr val="accent3"/>
+                </a:solidFill>
+              </a:rPr>
+              <a:t> = 6% extra flash !</a:t>
+            </a:r>
+          </a:p>
+          <a:p>
+            <a:pPr lvl="1" eaLnBrk="1" hangingPunct="1">
+              <a:buFontTx/>
+              <a:buChar char="-"/>
+            </a:pPr>
+            <a:r>
+              <a:rPr lang="nl-BE" sz="2400" dirty="0" err="1" smtClean="0">
+                <a:solidFill>
+                  <a:schemeClr val="accent3"/>
+                </a:solidFill>
+              </a:rPr>
+              <a:t>MYScontroller</a:t>
+            </a:r>
+            <a:r>
+              <a:rPr lang="nl-BE" sz="2400" dirty="0" smtClean="0">
+                <a:solidFill>
+                  <a:schemeClr val="accent3"/>
+                </a:solidFill>
+              </a:rPr>
+              <a:t> (demo)  !!  </a:t>
+            </a:r>
+            <a:r>
+              <a:rPr lang="nl-BE" sz="2400" dirty="0">
+                <a:solidFill>
+                  <a:schemeClr val="accent3"/>
+                </a:solidFill>
+              </a:rPr>
+              <a:t>g</a:t>
+            </a:r>
+            <a:r>
+              <a:rPr lang="nl-BE" sz="2400" dirty="0" smtClean="0">
+                <a:solidFill>
+                  <a:schemeClr val="accent3"/>
+                </a:solidFill>
+              </a:rPr>
+              <a:t>ateway </a:t>
+            </a:r>
+            <a:r>
+              <a:rPr lang="nl-BE" sz="2400" dirty="0" err="1" smtClean="0">
+                <a:solidFill>
+                  <a:schemeClr val="accent3"/>
+                </a:solidFill>
+              </a:rPr>
+              <a:t>interaction</a:t>
+            </a:r>
+            <a:r>
+              <a:rPr lang="nl-BE" sz="2400" dirty="0" smtClean="0">
+                <a:solidFill>
+                  <a:schemeClr val="accent3"/>
+                </a:solidFill>
+              </a:rPr>
+              <a:t> !!</a:t>
+            </a:r>
+          </a:p>
+          <a:p>
+            <a:pPr lvl="2" eaLnBrk="1" hangingPunct="1">
+              <a:buFontTx/>
+              <a:buChar char="-"/>
+            </a:pPr>
+            <a:r>
+              <a:rPr lang="nl-BE" sz="2000" dirty="0">
+                <a:solidFill>
+                  <a:schemeClr val="accent3"/>
+                </a:solidFill>
+                <a:hlinkClick r:id="rId3"/>
+              </a:rPr>
+              <a:t>http://</a:t>
+            </a:r>
+            <a:r>
+              <a:rPr lang="nl-BE" sz="2000" dirty="0" smtClean="0">
+                <a:solidFill>
+                  <a:schemeClr val="accent3"/>
+                </a:solidFill>
+                <a:hlinkClick r:id="rId3"/>
+              </a:rPr>
+              <a:t>www.mysensors.org/controller/myscontroller</a:t>
+            </a:r>
+            <a:endParaRPr lang="nl-BE" sz="2000" dirty="0" smtClean="0">
               <a:solidFill>
-                <a:schemeClr val="bg1"/>
+                <a:schemeClr val="accent3"/>
               </a:solidFill>
             </a:endParaRPr>
           </a:p>
+          <a:p>
+            <a:pPr lvl="1" eaLnBrk="1" hangingPunct="1">
+              <a:buFontTx/>
+              <a:buChar char="-"/>
+            </a:pPr>
+            <a:r>
+              <a:rPr lang="nl-BE" sz="2400" dirty="0" smtClean="0">
+                <a:solidFill>
+                  <a:schemeClr val="accent3"/>
+                </a:solidFill>
+              </a:rPr>
+              <a:t>NRF24 </a:t>
+            </a:r>
+            <a:r>
+              <a:rPr lang="nl-BE" sz="2400" dirty="0" err="1" smtClean="0">
+                <a:solidFill>
+                  <a:schemeClr val="accent3"/>
+                </a:solidFill>
+              </a:rPr>
+              <a:t>sniffer</a:t>
+            </a:r>
+            <a:r>
+              <a:rPr lang="nl-BE" sz="2400" dirty="0" smtClean="0">
+                <a:solidFill>
+                  <a:schemeClr val="accent3"/>
+                </a:solidFill>
+              </a:rPr>
+              <a:t> (demo : </a:t>
+            </a:r>
+            <a:r>
+              <a:rPr lang="nl-BE" sz="2400" dirty="0" err="1" smtClean="0">
+                <a:solidFill>
+                  <a:schemeClr val="accent3"/>
+                </a:solidFill>
+              </a:rPr>
+              <a:t>see</a:t>
+            </a:r>
+            <a:r>
+              <a:rPr lang="nl-BE" sz="2400" dirty="0" smtClean="0">
+                <a:solidFill>
+                  <a:schemeClr val="accent3"/>
+                </a:solidFill>
+              </a:rPr>
+              <a:t> next slide) </a:t>
+            </a:r>
+          </a:p>
+          <a:p>
+            <a:pPr lvl="2" eaLnBrk="1" hangingPunct="1">
+              <a:buFontTx/>
+              <a:buChar char="-"/>
+            </a:pPr>
+            <a:r>
+              <a:rPr lang="nl-BE" sz="2000" dirty="0">
+                <a:solidFill>
+                  <a:schemeClr val="accent3"/>
+                </a:solidFill>
+                <a:hlinkClick r:id="rId4"/>
+              </a:rPr>
+              <a:t>http://</a:t>
+            </a:r>
+            <a:r>
+              <a:rPr lang="nl-BE" sz="2000" dirty="0" smtClean="0">
+                <a:solidFill>
+                  <a:schemeClr val="accent3"/>
+                </a:solidFill>
+                <a:hlinkClick r:id="rId4"/>
+              </a:rPr>
+              <a:t>forum.mysensors.org/topic/242/wireless-nrf24l01-sniffer-for-mysensors</a:t>
+            </a:r>
+            <a:endParaRPr lang="nl-BE" sz="2000" dirty="0" smtClean="0">
+              <a:solidFill>
+                <a:schemeClr val="accent3"/>
+              </a:solidFill>
+            </a:endParaRPr>
+          </a:p>
+          <a:p>
+            <a:pPr lvl="2" eaLnBrk="1" hangingPunct="1">
+              <a:buFontTx/>
+              <a:buChar char="-"/>
+            </a:pPr>
+            <a:endParaRPr lang="nl-BE" sz="2000" dirty="0" smtClean="0">
+              <a:solidFill>
+                <a:schemeClr val="accent3"/>
+              </a:solidFill>
+            </a:endParaRPr>
+          </a:p>
         </p:txBody>
       </p:sp>
       <p:pic>
         <p:nvPicPr>
-          <p:cNvPr id="3" name="Picture 2"/>
+          <p:cNvPr id="4098" name="Picture 2"/>
           <p:cNvPicPr>
             <a:picLocks noChangeAspect="1" noChangeArrowheads="1"/>
           </p:cNvPicPr>
           <p:nvPr/>
         </p:nvPicPr>
         <p:blipFill>
-          <a:blip r:embed="rId3">
+          <a:blip r:embed="rId5" cstate="print">
             <a:extLst>
               <a:ext uri="{28A0092B-C50C-407E-A947-70E740481C1C}">
-                <a14:useLocalDpi xmlns:a14="http://schemas.microsoft.com/office/drawing/2010/main" val="0"/>
+                <a14:useLocalDpi xmlns="" xmlns:a14="http://schemas.microsoft.com/office/drawing/2010/main" val="0"/>
               </a:ext>
             </a:extLst>
           </a:blip>
@@ -9312,8 +10211,8 @@
         </p:blipFill>
         <p:spPr bwMode="auto">
           <a:xfrm>
-            <a:off x="170012" y="1268760"/>
-            <a:ext cx="8868908" cy="4821535"/>
+            <a:off x="1642517" y="4509120"/>
+            <a:ext cx="6124575" cy="276225"/>
           </a:xfrm>
           <a:prstGeom prst="rect">
             <a:avLst/>
@@ -9324,14 +10223,14 @@
           </a:ln>
           <a:extLst>
             <a:ext uri="{909E8E84-426E-40DD-AFC4-6F175D3DCCD1}">
-              <a14:hiddenFill xmlns:a14="http://schemas.microsoft.com/office/drawing/2010/main">
+              <a14:hiddenFill xmlns="" xmlns:a14="http://schemas.microsoft.com/office/drawing/2010/main">
                 <a:solidFill>
                   <a:schemeClr val="accent1"/>
                 </a:solidFill>
               </a14:hiddenFill>
             </a:ext>
             <a:ext uri="{91240B29-F687-4F45-9708-019B960494DF}">
-              <a14:hiddenLine xmlns:a14="http://schemas.microsoft.com/office/drawing/2010/main" w="9525">
+              <a14:hiddenLine xmlns="" xmlns:a14="http://schemas.microsoft.com/office/drawing/2010/main" w="9525">
                 <a:solidFill>
                   <a:schemeClr val="tx1"/>
                 </a:solidFill>
@@ -9345,17 +10244,17 @@
       </p:pic>
       <p:pic>
         <p:nvPicPr>
-          <p:cNvPr id="8" name="Picture 3"/>
+          <p:cNvPr id="4099" name="Picture 3"/>
           <p:cNvPicPr>
             <a:picLocks noChangeAspect="1" noChangeArrowheads="1"/>
           </p:cNvPicPr>
           <p:nvPr/>
         </p:nvPicPr>
         <p:blipFill>
-          <a:blip r:embed="rId4">
+          <a:blip r:embed="rId6" cstate="print">
             <a:extLst>
               <a:ext uri="{28A0092B-C50C-407E-A947-70E740481C1C}">
-                <a14:useLocalDpi xmlns:a14="http://schemas.microsoft.com/office/drawing/2010/main" val="0"/>
+                <a14:useLocalDpi xmlns="" xmlns:a14="http://schemas.microsoft.com/office/drawing/2010/main" val="0"/>
               </a:ext>
             </a:extLst>
           </a:blip>
@@ -9366,8 +10265,8 @@
         </p:blipFill>
         <p:spPr bwMode="auto">
           <a:xfrm>
-            <a:off x="4070761" y="6175548"/>
-            <a:ext cx="4924425" cy="552450"/>
+            <a:off x="1619672" y="5157192"/>
+            <a:ext cx="6124575" cy="276225"/>
           </a:xfrm>
           <a:prstGeom prst="rect">
             <a:avLst/>
@@ -9378,14 +10277,14 @@
           </a:ln>
           <a:extLst>
             <a:ext uri="{909E8E84-426E-40DD-AFC4-6F175D3DCCD1}">
-              <a14:hiddenFill xmlns:a14="http://schemas.microsoft.com/office/drawing/2010/main">
+              <a14:hiddenFill xmlns="" xmlns:a14="http://schemas.microsoft.com/office/drawing/2010/main">
                 <a:solidFill>
                   <a:schemeClr val="accent1"/>
                 </a:solidFill>
               </a14:hiddenFill>
             </a:ext>
             <a:ext uri="{91240B29-F687-4F45-9708-019B960494DF}">
-              <a14:hiddenLine xmlns:a14="http://schemas.microsoft.com/office/drawing/2010/main" w="9525">
+              <a14:hiddenLine xmlns="" xmlns:a14="http://schemas.microsoft.com/office/drawing/2010/main" w="9525">
                 <a:solidFill>
                   <a:schemeClr val="tx1"/>
                 </a:solidFill>
@@ -9397,19 +10296,112 @@
           </a:extLst>
         </p:spPr>
       </p:pic>
+    </p:spTree>
+    <p:extLst>
+      <p:ext uri="{BB962C8B-B14F-4D97-AF65-F5344CB8AC3E}">
+        <p14:creationId xmlns="" xmlns:p14="http://schemas.microsoft.com/office/powerpoint/2010/main" val="2402787109"/>
+      </p:ext>
+    </p:extLst>
+  </p:cSld>
+  <p:clrMapOvr>
+    <a:masterClrMapping/>
+  </p:clrMapOvr>
+  <p:timing>
+    <p:tnLst>
+      <p:par>
+        <p:cTn id="1" dur="indefinite" restart="never" nodeType="tmRoot"/>
+      </p:par>
+    </p:tnLst>
+  </p:timing>
+</p:sld>
+</file>
+
+<file path=ppt/slides/slide19.xml><?xml version="1.0" encoding="utf-8"?>
+<p:sld xmlns:a="http://schemas.openxmlformats.org/drawingml/2006/main" xmlns:r="http://schemas.openxmlformats.org/officeDocument/2006/relationships" xmlns:p="http://schemas.openxmlformats.org/presentationml/2006/main">
+  <p:cSld>
+    <p:spTree>
+      <p:nvGrpSpPr>
+        <p:cNvPr id="1" name=""/>
+        <p:cNvGrpSpPr/>
+        <p:nvPr/>
+      </p:nvGrpSpPr>
+      <p:grpSpPr>
+        <a:xfrm>
+          <a:off x="0" y="0"/>
+          <a:ext cx="0" cy="0"/>
+          <a:chOff x="0" y="0"/>
+          <a:chExt cx="0" cy="0"/>
+        </a:xfrm>
+      </p:grpSpPr>
+      <p:sp>
+        <p:nvSpPr>
+          <p:cNvPr id="5122" name="Title 1"/>
+          <p:cNvSpPr>
+            <a:spLocks noGrp="1"/>
+          </p:cNvSpPr>
+          <p:nvPr>
+            <p:ph type="title"/>
+          </p:nvPr>
+        </p:nvSpPr>
+        <p:spPr/>
+        <p:txBody>
+          <a:bodyPr/>
+          <a:lstStyle/>
+          <a:p>
+            <a:pPr eaLnBrk="1" hangingPunct="1"/>
+            <a:r>
+              <a:rPr lang="nl-BE" sz="4000" dirty="0" smtClean="0">
+                <a:solidFill>
+                  <a:schemeClr val="bg1"/>
+                </a:solidFill>
+              </a:rPr>
+              <a:t>LED node : </a:t>
+            </a:r>
+            <a:r>
+              <a:rPr lang="nl-BE" sz="4000" dirty="0" err="1" smtClean="0">
+                <a:solidFill>
+                  <a:schemeClr val="bg1"/>
+                </a:solidFill>
+              </a:rPr>
+              <a:t>wireshark</a:t>
+            </a:r>
+            <a:r>
+              <a:rPr lang="nl-BE" sz="4000" dirty="0" smtClean="0">
+                <a:solidFill>
+                  <a:schemeClr val="bg1"/>
+                </a:solidFill>
+              </a:rPr>
+              <a:t> air </a:t>
+            </a:r>
+            <a:r>
+              <a:rPr lang="nl-BE" sz="4000" dirty="0" err="1" smtClean="0">
+                <a:solidFill>
+                  <a:schemeClr val="bg1"/>
+                </a:solidFill>
+              </a:rPr>
+              <a:t>capture</a:t>
+            </a:r>
+            <a:endParaRPr lang="nl-BE" sz="4000" dirty="0" smtClean="0">
+              <a:solidFill>
+                <a:schemeClr val="bg1"/>
+              </a:solidFill>
+            </a:endParaRPr>
+          </a:p>
+        </p:txBody>
+      </p:sp>
       <p:pic>
         <p:nvPicPr>
-          <p:cNvPr id="4" name="Picture 3"/>
+          <p:cNvPr id="3" name="Picture 2"/>
           <p:cNvPicPr>
             <a:picLocks noChangeAspect="1" noChangeArrowheads="1"/>
           </p:cNvPicPr>
           <p:nvPr/>
         </p:nvPicPr>
         <p:blipFill>
-          <a:blip r:embed="rId5">
+          <a:blip r:embed="rId3" cstate="print">
             <a:extLst>
               <a:ext uri="{28A0092B-C50C-407E-A947-70E740481C1C}">
-                <a14:useLocalDpi xmlns:a14="http://schemas.microsoft.com/office/drawing/2010/main" val="0"/>
+                <a14:useLocalDpi xmlns="" xmlns:a14="http://schemas.microsoft.com/office/drawing/2010/main" val="0"/>
               </a:ext>
             </a:extLst>
           </a:blip>
@@ -9420,8 +10412,8 @@
         </p:blipFill>
         <p:spPr bwMode="auto">
           <a:xfrm>
-            <a:off x="6300192" y="3429000"/>
-            <a:ext cx="1104900" cy="1857375"/>
+            <a:off x="179512" y="1268760"/>
+            <a:ext cx="8868908" cy="4821535"/>
           </a:xfrm>
           <a:prstGeom prst="rect">
             <a:avLst/>
@@ -9432,14 +10424,122 @@
           </a:ln>
           <a:extLst>
             <a:ext uri="{909E8E84-426E-40DD-AFC4-6F175D3DCCD1}">
-              <a14:hiddenFill xmlns:a14="http://schemas.microsoft.com/office/drawing/2010/main">
+              <a14:hiddenFill xmlns="" xmlns:a14="http://schemas.microsoft.com/office/drawing/2010/main">
                 <a:solidFill>
                   <a:schemeClr val="accent1"/>
                 </a:solidFill>
               </a14:hiddenFill>
             </a:ext>
             <a:ext uri="{91240B29-F687-4F45-9708-019B960494DF}">
-              <a14:hiddenLine xmlns:a14="http://schemas.microsoft.com/office/drawing/2010/main" w="9525">
+              <a14:hiddenLine xmlns="" xmlns:a14="http://schemas.microsoft.com/office/drawing/2010/main" w="9525">
+                <a:solidFill>
+                  <a:schemeClr val="tx1"/>
+                </a:solidFill>
+                <a:miter lim="800000"/>
+                <a:headEnd/>
+                <a:tailEnd/>
+              </a14:hiddenLine>
+            </a:ext>
+          </a:extLst>
+        </p:spPr>
+      </p:pic>
+      <p:pic>
+        <p:nvPicPr>
+          <p:cNvPr id="8" name="Picture 3"/>
+          <p:cNvPicPr>
+            <a:picLocks noChangeAspect="1" noChangeArrowheads="1"/>
+          </p:cNvPicPr>
+          <p:nvPr/>
+        </p:nvPicPr>
+        <p:blipFill>
+          <a:blip r:embed="rId4" cstate="print">
+            <a:extLst>
+              <a:ext uri="{28A0092B-C50C-407E-A947-70E740481C1C}">
+                <a14:useLocalDpi xmlns="" xmlns:a14="http://schemas.microsoft.com/office/drawing/2010/main" val="0"/>
+              </a:ext>
+            </a:extLst>
+          </a:blip>
+          <a:srcRect/>
+          <a:stretch>
+            <a:fillRect/>
+          </a:stretch>
+        </p:blipFill>
+        <p:spPr bwMode="auto">
+          <a:xfrm>
+            <a:off x="4070761" y="6175548"/>
+            <a:ext cx="4924425" cy="552450"/>
+          </a:xfrm>
+          <a:prstGeom prst="rect">
+            <a:avLst/>
+          </a:prstGeom>
+          <a:noFill/>
+          <a:ln>
+            <a:noFill/>
+          </a:ln>
+          <a:extLst>
+            <a:ext uri="{909E8E84-426E-40DD-AFC4-6F175D3DCCD1}">
+              <a14:hiddenFill xmlns="" xmlns:a14="http://schemas.microsoft.com/office/drawing/2010/main">
+                <a:solidFill>
+                  <a:schemeClr val="accent1"/>
+                </a:solidFill>
+              </a14:hiddenFill>
+            </a:ext>
+            <a:ext uri="{91240B29-F687-4F45-9708-019B960494DF}">
+              <a14:hiddenLine xmlns="" xmlns:a14="http://schemas.microsoft.com/office/drawing/2010/main" w="9525">
+                <a:solidFill>
+                  <a:schemeClr val="tx1"/>
+                </a:solidFill>
+                <a:miter lim="800000"/>
+                <a:headEnd/>
+                <a:tailEnd/>
+              </a14:hiddenLine>
+            </a:ext>
+          </a:extLst>
+        </p:spPr>
+      </p:pic>
+      <p:pic>
+        <p:nvPicPr>
+          <p:cNvPr id="4" name="Picture 3"/>
+          <p:cNvPicPr>
+            <a:picLocks noChangeAspect="1" noChangeArrowheads="1"/>
+          </p:cNvPicPr>
+          <p:nvPr/>
+        </p:nvPicPr>
+        <p:blipFill>
+          <a:blip r:embed="rId5" cstate="print">
+            <a:extLst>
+              <a:ext uri="{28A0092B-C50C-407E-A947-70E740481C1C}">
+                <a14:useLocalDpi xmlns="" xmlns:a14="http://schemas.microsoft.com/office/drawing/2010/main" val="0"/>
+              </a:ext>
+            </a:extLst>
+          </a:blip>
+          <a:srcRect/>
+          <a:stretch>
+            <a:fillRect/>
+          </a:stretch>
+        </p:blipFill>
+        <p:spPr bwMode="auto">
+          <a:xfrm>
+            <a:off x="6300192" y="3429000"/>
+            <a:ext cx="1104900" cy="1857375"/>
+          </a:xfrm>
+          <a:prstGeom prst="rect">
+            <a:avLst/>
+          </a:prstGeom>
+          <a:noFill/>
+          <a:ln>
+            <a:noFill/>
+          </a:ln>
+          <a:extLst>
+            <a:ext uri="{909E8E84-426E-40DD-AFC4-6F175D3DCCD1}">
+              <a14:hiddenFill xmlns="" xmlns:a14="http://schemas.microsoft.com/office/drawing/2010/main">
+                <a:solidFill>
+                  <a:schemeClr val="accent1"/>
+                </a:solidFill>
+              </a14:hiddenFill>
+            </a:ext>
+            <a:ext uri="{91240B29-F687-4F45-9708-019B960494DF}">
+              <a14:hiddenLine xmlns="" xmlns:a14="http://schemas.microsoft.com/office/drawing/2010/main" w="9525">
                 <a:solidFill>
                   <a:schemeClr val="tx1"/>
                 </a:solidFill>
@@ -9786,7 +10886,7 @@
     </p:spTree>
     <p:extLst>
       <p:ext uri="{BB962C8B-B14F-4D97-AF65-F5344CB8AC3E}">
-        <p14:creationId xmlns:p14="http://schemas.microsoft.com/office/powerpoint/2010/main" val="3503312686"/>
+        <p14:creationId xmlns="" xmlns:p14="http://schemas.microsoft.com/office/powerpoint/2010/main" val="3503312686"/>
       </p:ext>
     </p:extLst>
   </p:cSld>
@@ -10176,7 +11276,7 @@
     </p:spTree>
     <p:extLst>
       <p:ext uri="{BB962C8B-B14F-4D97-AF65-F5344CB8AC3E}">
-        <p14:creationId xmlns:p14="http://schemas.microsoft.com/office/powerpoint/2010/main" val="1949858995"/>
+        <p14:creationId xmlns="" xmlns:p14="http://schemas.microsoft.com/office/powerpoint/2010/main" val="1949858995"/>
       </p:ext>
     </p:extLst>
   </p:cSld>
@@ -10482,7 +11582,7 @@
     </p:spTree>
     <p:extLst>
       <p:ext uri="{BB962C8B-B14F-4D97-AF65-F5344CB8AC3E}">
-        <p14:creationId xmlns:p14="http://schemas.microsoft.com/office/powerpoint/2010/main" val="460190410"/>
+        <p14:creationId xmlns="" xmlns:p14="http://schemas.microsoft.com/office/powerpoint/2010/main" val="460190410"/>
       </p:ext>
     </p:extLst>
   </p:cSld>
@@ -10590,7 +11690,7 @@
           <a:blip r:embed="rId3" cstate="print">
             <a:extLst>
               <a:ext uri="{28A0092B-C50C-407E-A947-70E740481C1C}">
-                <a14:useLocalDpi xmlns:a14="http://schemas.microsoft.com/office/drawing/2010/main" val="0"/>
+                <a14:useLocalDpi xmlns="" xmlns:a14="http://schemas.microsoft.com/office/drawing/2010/main" val="0"/>
               </a:ext>
             </a:extLst>
           </a:blip>
@@ -10610,7 +11710,7 @@
           <a:noFill/>
           <a:extLst>
             <a:ext uri="{909E8E84-426E-40DD-AFC4-6F175D3DCCD1}">
-              <a14:hiddenFill xmlns:a14="http://schemas.microsoft.com/office/drawing/2010/main">
+              <a14:hiddenFill xmlns="" xmlns:a14="http://schemas.microsoft.com/office/drawing/2010/main">
                 <a:solidFill>
                   <a:srgbClr val="FFFFFF"/>
                 </a:solidFill>
@@ -10832,7 +11932,7 @@
           <a:noFill/>
           <a:extLst>
             <a:ext uri="{909E8E84-426E-40DD-AFC4-6F175D3DCCD1}">
-              <a14:hiddenFill xmlns:a14="http://schemas.microsoft.com/office/drawing/2010/main">
+              <a14:hiddenFill xmlns="" xmlns:a14="http://schemas.microsoft.com/office/drawing/2010/main">
                 <a:solidFill>
                   <a:srgbClr val="FFFFFF"/>
                 </a:solidFill>
@@ -10871,7 +11971,7 @@
           <a:noFill/>
           <a:extLst>
             <a:ext uri="{909E8E84-426E-40DD-AFC4-6F175D3DCCD1}">
-              <a14:hiddenFill xmlns:a14="http://schemas.microsoft.com/office/drawing/2010/main">
+              <a14:hiddenFill xmlns="" xmlns:a14="http://schemas.microsoft.com/office/drawing/2010/main">
                 <a:solidFill>
                   <a:srgbClr val="FFFFFF"/>
                 </a:solidFill>
@@ -10903,7 +12003,7 @@
           <a:blip r:embed="rId4" cstate="print">
             <a:extLst>
               <a:ext uri="{28A0092B-C50C-407E-A947-70E740481C1C}">
-                <a14:useLocalDpi xmlns:a14="http://schemas.microsoft.com/office/drawing/2010/main" val="0"/>
+                <a14:useLocalDpi xmlns="" xmlns:a14="http://schemas.microsoft.com/office/drawing/2010/main" val="0"/>
               </a:ext>
             </a:extLst>
           </a:blip>
@@ -10923,7 +12023,7 @@
           <a:noFill/>
           <a:extLst>
             <a:ext uri="{909E8E84-426E-40DD-AFC4-6F175D3DCCD1}">
-              <a14:hiddenFill xmlns:a14="http://schemas.microsoft.com/office/drawing/2010/main">
+              <a14:hiddenFill xmlns="" xmlns:a14="http://schemas.microsoft.com/office/drawing/2010/main">
                 <a:solidFill>
                   <a:srgbClr val="FFFFFF"/>
                 </a:solidFill>
@@ -10982,7 +12082,7 @@
           <a:blip r:embed="rId5" cstate="print">
             <a:extLst>
               <a:ext uri="{28A0092B-C50C-407E-A947-70E740481C1C}">
-                <a14:useLocalDpi xmlns:a14="http://schemas.microsoft.com/office/drawing/2010/main" val="0"/>
+                <a14:useLocalDpi xmlns="" xmlns:a14="http://schemas.microsoft.com/office/drawing/2010/main" val="0"/>
               </a:ext>
             </a:extLst>
           </a:blip>
@@ -11005,14 +12105,14 @@
           </a:ln>
           <a:extLst>
             <a:ext uri="{909E8E84-426E-40DD-AFC4-6F175D3DCCD1}">
-              <a14:hiddenFill xmlns:a14="http://schemas.microsoft.com/office/drawing/2010/main">
+              <a14:hiddenFill xmlns="" xmlns:a14="http://schemas.microsoft.com/office/drawing/2010/main">
                 <a:solidFill>
                   <a:schemeClr val="accent1"/>
                 </a:solidFill>
               </a14:hiddenFill>
             </a:ext>
             <a:ext uri="{91240B29-F687-4F45-9708-019B960494DF}">
-              <a14:hiddenLine xmlns:a14="http://schemas.microsoft.com/office/drawing/2010/main" w="9525">
+              <a14:hiddenLine xmlns="" xmlns:a14="http://schemas.microsoft.com/office/drawing/2010/main" w="9525">
                 <a:solidFill>
                   <a:schemeClr val="tx1"/>
                 </a:solidFill>
@@ -12329,7 +13429,7 @@
     </p:spTree>
     <p:extLst>
       <p:ext uri="{BB962C8B-B14F-4D97-AF65-F5344CB8AC3E}">
-        <p14:creationId xmlns:p14="http://schemas.microsoft.com/office/powerpoint/2010/main" val="401786975"/>
+        <p14:creationId xmlns="" xmlns:p14="http://schemas.microsoft.com/office/powerpoint/2010/main" val="401786975"/>
       </p:ext>
     </p:extLst>
   </p:cSld>
@@ -12461,7 +13561,7 @@
           <a:blip r:embed="rId3" cstate="print">
             <a:extLst>
               <a:ext uri="{28A0092B-C50C-407E-A947-70E740481C1C}">
-                <a14:useLocalDpi xmlns:a14="http://schemas.microsoft.com/office/drawing/2010/main" val="0"/>
+                <a14:useLocalDpi xmlns="" xmlns:a14="http://schemas.microsoft.com/office/drawing/2010/main" val="0"/>
               </a:ext>
             </a:extLst>
           </a:blip>
@@ -12481,7 +13581,7 @@
           <a:noFill/>
           <a:extLst>
             <a:ext uri="{909E8E84-426E-40DD-AFC4-6F175D3DCCD1}">
-              <a14:hiddenFill xmlns:a14="http://schemas.microsoft.com/office/drawing/2010/main">
+              <a14:hiddenFill xmlns="" xmlns:a14="http://schemas.microsoft.com/office/drawing/2010/main">
                 <a:solidFill>
                   <a:srgbClr val="FFFFFF"/>
                 </a:solidFill>
@@ -12703,7 +13803,7 @@
           <a:noFill/>
           <a:extLst>
             <a:ext uri="{909E8E84-426E-40DD-AFC4-6F175D3DCCD1}">
-              <a14:hiddenFill xmlns:a14="http://schemas.microsoft.com/office/drawing/2010/main">
+              <a14:hiddenFill xmlns="" xmlns:a14="http://schemas.microsoft.com/office/drawing/2010/main">
                 <a:solidFill>
                   <a:srgbClr val="FFFFFF"/>
                 </a:solidFill>
@@ -12742,7 +13842,7 @@
           <a:noFill/>
           <a:extLst>
             <a:ext uri="{909E8E84-426E-40DD-AFC4-6F175D3DCCD1}">
-              <a14:hiddenFill xmlns:a14="http://schemas.microsoft.com/office/drawing/2010/main">
+              <a14:hiddenFill xmlns="" xmlns:a14="http://schemas.microsoft.com/office/drawing/2010/main">
                 <a:solidFill>
                   <a:srgbClr val="FFFFFF"/>
                 </a:solidFill>
@@ -12774,7 +13874,7 @@
           <a:blip r:embed="rId4" cstate="print">
             <a:extLst>
               <a:ext uri="{28A0092B-C50C-407E-A947-70E740481C1C}">
-                <a14:useLocalDpi xmlns:a14="http://schemas.microsoft.com/office/drawing/2010/main" val="0"/>
+                <a14:useLocalDpi xmlns="" xmlns:a14="http://schemas.microsoft.com/office/drawing/2010/main" val="0"/>
               </a:ext>
             </a:extLst>
           </a:blip>
@@ -12794,7 +13894,7 @@
           <a:noFill/>
           <a:extLst>
             <a:ext uri="{909E8E84-426E-40DD-AFC4-6F175D3DCCD1}">
-              <a14:hiddenFill xmlns:a14="http://schemas.microsoft.com/office/drawing/2010/main">
+              <a14:hiddenFill xmlns="" xmlns:a14="http://schemas.microsoft.com/office/drawing/2010/main">
                 <a:solidFill>
                   <a:srgbClr val="FFFFFF"/>
                 </a:solidFill>
@@ -12815,7 +13915,7 @@
           <a:blip r:embed="rId5" cstate="print">
             <a:extLst>
               <a:ext uri="{28A0092B-C50C-407E-A947-70E740481C1C}">
-                <a14:useLocalDpi xmlns:a14="http://schemas.microsoft.com/office/drawing/2010/main" val="0"/>
+                <a14:useLocalDpi xmlns="" xmlns:a14="http://schemas.microsoft.com/office/drawing/2010/main" val="0"/>
               </a:ext>
             </a:extLst>
           </a:blip>
@@ -12838,14 +13938,14 @@
           </a:ln>
           <a:extLst>
             <a:ext uri="{909E8E84-426E-40DD-AFC4-6F175D3DCCD1}">
-              <a14:hiddenFill xmlns:a14="http://schemas.microsoft.com/office/drawing/2010/main">
+              <a14:hiddenFill xmlns="" xmlns:a14="http://schemas.microsoft.com/office/drawing/2010/main">
                 <a:solidFill>
                   <a:schemeClr val="accent1"/>
                 </a:solidFill>
               </a14:hiddenFill>
             </a:ext>
             <a:ext uri="{91240B29-F687-4F45-9708-019B960494DF}">
-              <a14:hiddenLine xmlns:a14="http://schemas.microsoft.com/office/drawing/2010/main" w="9525">
+              <a14:hiddenLine xmlns="" xmlns:a14="http://schemas.microsoft.com/office/drawing/2010/main" w="9525">
                 <a:solidFill>
                   <a:schemeClr val="tx1"/>
                 </a:solidFill>
@@ -13934,7 +15034,7 @@
     </p:spTree>
     <p:extLst>
       <p:ext uri="{BB962C8B-B14F-4D97-AF65-F5344CB8AC3E}">
-        <p14:creationId xmlns:p14="http://schemas.microsoft.com/office/powerpoint/2010/main" val="2092694938"/>
+        <p14:creationId xmlns="" xmlns:p14="http://schemas.microsoft.com/office/powerpoint/2010/main" val="2092694938"/>
       </p:ext>
     </p:extLst>
   </p:cSld>
@@ -13980,7 +15080,7 @@
           <a:blip r:embed="rId3" cstate="print">
             <a:extLst>
               <a:ext uri="{28A0092B-C50C-407E-A947-70E740481C1C}">
-                <a14:useLocalDpi xmlns:a14="http://schemas.microsoft.com/office/drawing/2010/main" val="0"/>
+                <a14:useLocalDpi xmlns="" xmlns:a14="http://schemas.microsoft.com/office/drawing/2010/main" val="0"/>
               </a:ext>
             </a:extLst>
           </a:blip>
@@ -14000,7 +15100,7 @@
           <a:noFill/>
           <a:extLst>
             <a:ext uri="{909E8E84-426E-40DD-AFC4-6F175D3DCCD1}">
-              <a14:hiddenFill xmlns:a14="http://schemas.microsoft.com/office/drawing/2010/main">
+              <a14:hiddenFill xmlns="" xmlns:a14="http://schemas.microsoft.com/office/drawing/2010/main">
                 <a:solidFill>
                   <a:srgbClr val="FFFFFF"/>
                 </a:solidFill>
@@ -14222,7 +15322,7 @@
           <a:noFill/>
           <a:extLst>
             <a:ext uri="{909E8E84-426E-40DD-AFC4-6F175D3DCCD1}">
-              <a14:hiddenFill xmlns:a14="http://schemas.microsoft.com/office/drawing/2010/main">
+              <a14:hiddenFill xmlns="" xmlns:a14="http://schemas.microsoft.com/office/drawing/2010/main">
                 <a:solidFill>
                   <a:srgbClr val="FFFFFF"/>
                 </a:solidFill>
@@ -14261,7 +15361,7 @@
           <a:noFill/>
           <a:extLst>
             <a:ext uri="{909E8E84-426E-40DD-AFC4-6F175D3DCCD1}">
-              <a14:hiddenFill xmlns:a14="http://schemas.microsoft.com/office/drawing/2010/main">
+              <a14:hiddenFill xmlns="" xmlns:a14="http://schemas.microsoft.com/office/drawing/2010/main">
                 <a:solidFill>
                   <a:srgbClr val="FFFFFF"/>
                 </a:solidFill>
@@ -14293,7 +15393,7 @@
           <a:blip r:embed="rId4" cstate="print">
             <a:extLst>
               <a:ext uri="{28A0092B-C50C-407E-A947-70E740481C1C}">
-                <a14:useLocalDpi xmlns:a14="http://schemas.microsoft.com/office/drawing/2010/main" val="0"/>
+                <a14:useLocalDpi xmlns="" xmlns:a14="http://schemas.microsoft.com/office/drawing/2010/main" val="0"/>
               </a:ext>
             </a:extLst>
           </a:blip>
@@ -14313,7 +15413,7 @@
           <a:noFill/>
           <a:extLst>
             <a:ext uri="{909E8E84-426E-40DD-AFC4-6F175D3DCCD1}">
-              <a14:hiddenFill xmlns:a14="http://schemas.microsoft.com/office/drawing/2010/main">
+              <a14:hiddenFill xmlns="" xmlns:a14="http://schemas.microsoft.com/office/drawing/2010/main">
                 <a:solidFill>
                   <a:srgbClr val="FFFFFF"/>
                 </a:solidFill>
@@ -14372,7 +15472,7 @@
           <a:blip r:embed="rId5" cstate="print">
             <a:extLst>
               <a:ext uri="{28A0092B-C50C-407E-A947-70E740481C1C}">
-                <a14:useLocalDpi xmlns:a14="http://schemas.microsoft.com/office/drawing/2010/main" val="0"/>
+                <a14:useLocalDpi xmlns="" xmlns:a14="http://schemas.microsoft.com/office/drawing/2010/main" val="0"/>
               </a:ext>
             </a:extLst>
           </a:blip>
@@ -14395,14 +15495,14 @@
           </a:ln>
           <a:extLst>
             <a:ext uri="{909E8E84-426E-40DD-AFC4-6F175D3DCCD1}">
-              <a14:hiddenFill xmlns:a14="http://schemas.microsoft.com/office/drawing/2010/main">
+              <a14:hiddenFill xmlns="" xmlns:a14="http://schemas.microsoft.com/office/drawing/2010/main">
                 <a:solidFill>
                   <a:schemeClr val="accent1"/>
                 </a:solidFill>
               </a14:hiddenFill>
             </a:ext>
             <a:ext uri="{91240B29-F687-4F45-9708-019B960494DF}">
-              <a14:hiddenLine xmlns:a14="http://schemas.microsoft.com/office/drawing/2010/main" w="9525">
+              <a14:hiddenLine xmlns="" xmlns:a14="http://schemas.microsoft.com/office/drawing/2010/main" w="9525">
                 <a:solidFill>
                   <a:schemeClr val="tx1"/>
                 </a:solidFill>
@@ -15538,7 +16638,7 @@
           <a:blip r:embed="rId4" cstate="print">
             <a:extLst>
               <a:ext uri="{28A0092B-C50C-407E-A947-70E740481C1C}">
-                <a14:useLocalDpi xmlns:a14="http://schemas.microsoft.com/office/drawing/2010/main" val="0"/>
+                <a14:useLocalDpi xmlns="" xmlns:a14="http://schemas.microsoft.com/office/drawing/2010/main" val="0"/>
               </a:ext>
             </a:extLst>
           </a:blip>
@@ -15558,7 +16658,7 @@
           <a:noFill/>
           <a:extLst>
             <a:ext uri="{909E8E84-426E-40DD-AFC4-6F175D3DCCD1}">
-              <a14:hiddenFill xmlns:a14="http://schemas.microsoft.com/office/drawing/2010/main">
+              <a14:hiddenFill xmlns="" xmlns:a14="http://schemas.microsoft.com/office/drawing/2010/main">
                 <a:solidFill>
                   <a:srgbClr val="FFFFFF"/>
                 </a:solidFill>
@@ -15579,7 +16679,7 @@
           <a:blip r:embed="rId4" cstate="print">
             <a:extLst>
               <a:ext uri="{28A0092B-C50C-407E-A947-70E740481C1C}">
-                <a14:useLocalDpi xmlns:a14="http://schemas.microsoft.com/office/drawing/2010/main" val="0"/>
+                <a14:useLocalDpi xmlns="" xmlns:a14="http://schemas.microsoft.com/office/drawing/2010/main" val="0"/>
               </a:ext>
             </a:extLst>
           </a:blip>
@@ -15599,7 +16699,7 @@
           <a:noFill/>
           <a:extLst>
             <a:ext uri="{909E8E84-426E-40DD-AFC4-6F175D3DCCD1}">
-              <a14:hiddenFill xmlns:a14="http://schemas.microsoft.com/office/drawing/2010/main">
+              <a14:hiddenFill xmlns="" xmlns:a14="http://schemas.microsoft.com/office/drawing/2010/main">
                 <a:solidFill>
                   <a:srgbClr val="FFFFFF"/>
                 </a:solidFill>
@@ -15620,7 +16720,7 @@
           <a:blip r:embed="rId4" cstate="print">
             <a:extLst>
               <a:ext uri="{28A0092B-C50C-407E-A947-70E740481C1C}">
-                <a14:useLocalDpi xmlns:a14="http://schemas.microsoft.com/office/drawing/2010/main" val="0"/>
+                <a14:useLocalDpi xmlns="" xmlns:a14="http://schemas.microsoft.com/office/drawing/2010/main" val="0"/>
               </a:ext>
             </a:extLst>
           </a:blip>
@@ -15640,7 +16740,7 @@
           <a:noFill/>
           <a:extLst>
             <a:ext uri="{909E8E84-426E-40DD-AFC4-6F175D3DCCD1}">
-              <a14:hiddenFill xmlns:a14="http://schemas.microsoft.com/office/drawing/2010/main">
+              <a14:hiddenFill xmlns="" xmlns:a14="http://schemas.microsoft.com/office/drawing/2010/main">
                 <a:solidFill>
                   <a:srgbClr val="FFFFFF"/>
                 </a:solidFill>
@@ -15661,7 +16761,7 @@
           <a:blip r:embed="rId4" cstate="print">
             <a:extLst>
               <a:ext uri="{28A0092B-C50C-407E-A947-70E740481C1C}">
-                <a14:useLocalDpi xmlns:a14="http://schemas.microsoft.com/office/drawing/2010/main" val="0"/>
+                <a14:useLocalDpi xmlns="" xmlns:a14="http://schemas.microsoft.com/office/drawing/2010/main" val="0"/>
               </a:ext>
             </a:extLst>
           </a:blip>
@@ -15681,7 +16781,7 @@
           <a:noFill/>
           <a:extLst>
             <a:ext uri="{909E8E84-426E-40DD-AFC4-6F175D3DCCD1}">
-              <a14:hiddenFill xmlns:a14="http://schemas.microsoft.com/office/drawing/2010/main">
+              <a14:hiddenFill xmlns="" xmlns:a14="http://schemas.microsoft.com/office/drawing/2010/main">
                 <a:solidFill>
                   <a:srgbClr val="FFFFFF"/>
                 </a:solidFill>
@@ -15702,7 +16802,7 @@
           <a:blip r:embed="rId4" cstate="print">
             <a:extLst>
               <a:ext uri="{28A0092B-C50C-407E-A947-70E740481C1C}">
-                <a14:useLocalDpi xmlns:a14="http://schemas.microsoft.com/office/drawing/2010/main" val="0"/>
+                <a14:useLocalDpi xmlns="" xmlns:a14="http://schemas.microsoft.com/office/drawing/2010/main" val="0"/>
               </a:ext>
             </a:extLst>
           </a:blip>
@@ -15722,7 +16822,7 @@
           <a:noFill/>
           <a:extLst>
             <a:ext uri="{909E8E84-426E-40DD-AFC4-6F175D3DCCD1}">
-              <a14:hiddenFill xmlns:a14="http://schemas.microsoft.com/office/drawing/2010/main">
+              <a14:hiddenFill xmlns="" xmlns:a14="http://schemas.microsoft.com/office/drawing/2010/main">
                 <a:solidFill>
                   <a:srgbClr val="FFFFFF"/>
                 </a:solidFill>
@@ -15743,7 +16843,7 @@
           <a:blip r:embed="rId4" cstate="print">
             <a:extLst>
               <a:ext uri="{28A0092B-C50C-407E-A947-70E740481C1C}">
-                <a14:useLocalDpi xmlns:a14="http://schemas.microsoft.com/office/drawing/2010/main" val="0"/>
+                <a14:useLocalDpi xmlns="" xmlns:a14="http://schemas.microsoft.com/office/drawing/2010/main" val="0"/>
               </a:ext>
             </a:extLst>
           </a:blip>
@@ -15763,7 +16863,7 @@
           <a:noFill/>
           <a:extLst>
             <a:ext uri="{909E8E84-426E-40DD-AFC4-6F175D3DCCD1}">
-              <a14:hiddenFill xmlns:a14="http://schemas.microsoft.com/office/drawing/2010/main">
+              <a14:hiddenFill xmlns="" xmlns:a14="http://schemas.microsoft.com/office/drawing/2010/main">
                 <a:solidFill>
                   <a:srgbClr val="FFFFFF"/>
                 </a:solidFill>
@@ -15775,7 +16875,7 @@
     </p:spTree>
     <p:extLst>
       <p:ext uri="{BB962C8B-B14F-4D97-AF65-F5344CB8AC3E}">
-        <p14:creationId xmlns:p14="http://schemas.microsoft.com/office/powerpoint/2010/main" val="1758779456"/>
+        <p14:creationId xmlns="" xmlns:p14="http://schemas.microsoft.com/office/powerpoint/2010/main" val="1758779456"/>
       </p:ext>
     </p:extLst>
   </p:cSld>
@@ -15821,7 +16921,7 @@
           <a:blip r:embed="rId3" cstate="print">
             <a:extLst>
               <a:ext uri="{28A0092B-C50C-407E-A947-70E740481C1C}">
-                <a14:useLocalDpi xmlns:a14="http://schemas.microsoft.com/office/drawing/2010/main" val="0"/>
+                <a14:useLocalDpi xmlns="" xmlns:a14="http://schemas.microsoft.com/office/drawing/2010/main" val="0"/>
               </a:ext>
             </a:extLst>
           </a:blip>
@@ -15841,7 +16941,7 @@
           <a:noFill/>
           <a:extLst>
             <a:ext uri="{909E8E84-426E-40DD-AFC4-6F175D3DCCD1}">
-              <a14:hiddenFill xmlns:a14="http://schemas.microsoft.com/office/drawing/2010/main">
+              <a14:hiddenFill xmlns="" xmlns:a14="http://schemas.microsoft.com/office/drawing/2010/main">
                 <a:solidFill>
                   <a:srgbClr val="FFFFFF"/>
                 </a:solidFill>
@@ -16063,7 +17163,7 @@
           <a:noFill/>
           <a:extLst>
             <a:ext uri="{909E8E84-426E-40DD-AFC4-6F175D3DCCD1}">
-              <a14:hiddenFill xmlns:a14="http://schemas.microsoft.com/office/drawing/2010/main">
+              <a14:hiddenFill xmlns="" xmlns:a14="http://schemas.microsoft.com/office/drawing/2010/main">
                 <a:solidFill>
                   <a:srgbClr val="FFFFFF"/>
                 </a:solidFill>
@@ -16102,7 +17202,7 @@
           <a:noFill/>
           <a:extLst>
             <a:ext uri="{909E8E84-426E-40DD-AFC4-6F175D3DCCD1}">
-              <a14:hiddenFill xmlns:a14="http://schemas.microsoft.com/office/drawing/2010/main">
+              <a14:hiddenFill xmlns="" xmlns:a14="http://schemas.microsoft.com/office/drawing/2010/main">
                 <a:solidFill>
                   <a:srgbClr val="FFFFFF"/>
                 </a:solidFill>
@@ -16134,7 +17234,7 @@
           <a:blip r:embed="rId4" cstate="print">
             <a:extLst>
               <a:ext uri="{28A0092B-C50C-407E-A947-70E740481C1C}">
-                <a14:useLocalDpi xmlns:a14="http://schemas.microsoft.com/office/drawing/2010/main" val="0"/>
+                <a14:useLocalDpi xmlns="" xmlns:a14="http://schemas.microsoft.com/office/drawing/2010/main" val="0"/>
               </a:ext>
             </a:extLst>
           </a:blip>
@@ -16154,7 +17254,7 @@
           <a:noFill/>
           <a:extLst>
             <a:ext uri="{909E8E84-426E-40DD-AFC4-6F175D3DCCD1}">
-              <a14:hiddenFill xmlns:a14="http://schemas.microsoft.com/office/drawing/2010/main">
+              <a14:hiddenFill xmlns="" xmlns:a14="http://schemas.microsoft.com/office/drawing/2010/main">
                 <a:solidFill>
                   <a:srgbClr val="FFFFFF"/>
                 </a:solidFill>
@@ -16213,7 +17313,7 @@
           <a:blip r:embed="rId5" cstate="print">
             <a:extLst>
               <a:ext uri="{28A0092B-C50C-407E-A947-70E740481C1C}">
-                <a14:useLocalDpi xmlns:a14="http://schemas.microsoft.com/office/drawing/2010/main" val="0"/>
+                <a14:useLocalDpi xmlns="" xmlns:a14="http://schemas.microsoft.com/office/drawing/2010/main" val="0"/>
               </a:ext>
             </a:extLst>
           </a:blip>
@@ -16236,14 +17336,14 @@
           </a:ln>
           <a:extLst>
             <a:ext uri="{909E8E84-426E-40DD-AFC4-6F175D3DCCD1}">
-              <a14:hiddenFill xmlns:a14="http://schemas.microsoft.com/office/drawing/2010/main">
+              <a14:hiddenFill xmlns="" xmlns:a14="http://schemas.microsoft.com/office/drawing/2010/main">
                 <a:solidFill>
                   <a:schemeClr val="accent1"/>
                 </a:solidFill>
               </a14:hiddenFill>
             </a:ext>
             <a:ext uri="{91240B29-F687-4F45-9708-019B960494DF}">
-              <a14:hiddenLine xmlns:a14="http://schemas.microsoft.com/office/drawing/2010/main" w="9525">
+              <a14:hiddenLine xmlns="" xmlns:a14="http://schemas.microsoft.com/office/drawing/2010/main" w="9525">
                 <a:solidFill>
                   <a:schemeClr val="tx1"/>
                 </a:solidFill>
@@ -17379,7 +18479,7 @@
           <a:blip r:embed="rId4" cstate="print">
             <a:extLst>
               <a:ext uri="{28A0092B-C50C-407E-A947-70E740481C1C}">
-                <a14:useLocalDpi xmlns:a14="http://schemas.microsoft.com/office/drawing/2010/main" val="0"/>
+                <a14:useLocalDpi xmlns="" xmlns:a14="http://schemas.microsoft.com/office/drawing/2010/main" val="0"/>
               </a:ext>
             </a:extLst>
           </a:blip>
@@ -17399,7 +18499,7 @@
           <a:noFill/>
           <a:extLst>
             <a:ext uri="{909E8E84-426E-40DD-AFC4-6F175D3DCCD1}">
-              <a14:hiddenFill xmlns:a14="http://schemas.microsoft.com/office/drawing/2010/main">
+              <a14:hiddenFill xmlns="" xmlns:a14="http://schemas.microsoft.com/office/drawing/2010/main">
                 <a:solidFill>
                   <a:srgbClr val="FFFFFF"/>
                 </a:solidFill>
@@ -17420,7 +18520,7 @@
           <a:blip r:embed="rId4" cstate="print">
             <a:extLst>
               <a:ext uri="{28A0092B-C50C-407E-A947-70E740481C1C}">
-                <a14:useLocalDpi xmlns:a14="http://schemas.microsoft.com/office/drawing/2010/main" val="0"/>
+                <a14:useLocalDpi xmlns="" xmlns:a14="http://schemas.microsoft.com/office/drawing/2010/main" val="0"/>
               </a:ext>
             </a:extLst>
           </a:blip>
@@ -17440,7 +18540,7 @@
           <a:noFill/>
           <a:extLst>
             <a:ext uri="{909E8E84-426E-40DD-AFC4-6F175D3DCCD1}">
-              <a14:hiddenFill xmlns:a14="http://schemas.microsoft.com/office/drawing/2010/main">
+              <a14:hiddenFill xmlns="" xmlns:a14="http://schemas.microsoft.com/office/drawing/2010/main">
                 <a:solidFill>
                   <a:srgbClr val="FFFFFF"/>
                 </a:solidFill>
@@ -17461,7 +18561,7 @@
           <a:blip r:embed="rId4" cstate="print">
             <a:extLst>
               <a:ext uri="{28A0092B-C50C-407E-A947-70E740481C1C}">
-                <a14:useLocalDpi xmlns:a14="http://schemas.microsoft.com/office/drawing/2010/main" val="0"/>
+                <a14:useLocalDpi xmlns="" xmlns:a14="http://schemas.microsoft.com/office/drawing/2010/main" val="0"/>
               </a:ext>
             </a:extLst>
           </a:blip>
@@ -17481,7 +18581,7 @@
           <a:noFill/>
           <a:extLst>
             <a:ext uri="{909E8E84-426E-40DD-AFC4-6F175D3DCCD1}">
-              <a14:hiddenFill xmlns:a14="http://schemas.microsoft.com/office/drawing/2010/main">
+              <a14:hiddenFill xmlns="" xmlns:a14="http://schemas.microsoft.com/office/drawing/2010/main">
                 <a:solidFill>
                   <a:srgbClr val="FFFFFF"/>
                 </a:solidFill>
@@ -17502,7 +18602,7 @@
           <a:blip r:embed="rId4" cstate="print">
             <a:extLst>
               <a:ext uri="{28A0092B-C50C-407E-A947-70E740481C1C}">
-                <a14:useLocalDpi xmlns:a14="http://schemas.microsoft.com/office/drawing/2010/main" val="0"/>
+                <a14:useLocalDpi xmlns="" xmlns:a14="http://schemas.microsoft.com/office/drawing/2010/main" val="0"/>
               </a:ext>
             </a:extLst>
           </a:blip>
@@ -17522,7 +18622,7 @@
           <a:noFill/>
           <a:extLst>
             <a:ext uri="{909E8E84-426E-40DD-AFC4-6F175D3DCCD1}">
-              <a14:hiddenFill xmlns:a14="http://schemas.microsoft.com/office/drawing/2010/main">
+              <a14:hiddenFill xmlns="" xmlns:a14="http://schemas.microsoft.com/office/drawing/2010/main">
                 <a:solidFill>
                   <a:srgbClr val="FFFFFF"/>
                 </a:solidFill>
@@ -17543,7 +18643,7 @@
           <a:blip r:embed="rId4" cstate="print">
             <a:extLst>
               <a:ext uri="{28A0092B-C50C-407E-A947-70E740481C1C}">
-                <a14:useLocalDpi xmlns:a14="http://schemas.microsoft.com/office/drawing/2010/main" val="0"/>
+                <a14:useLocalDpi xmlns="" xmlns:a14="http://schemas.microsoft.com/office/drawing/2010/main" val="0"/>
               </a:ext>
             </a:extLst>
           </a:blip>
@@ -17563,7 +18663,7 @@
           <a:noFill/>
           <a:extLst>
             <a:ext uri="{909E8E84-426E-40DD-AFC4-6F175D3DCCD1}">
-              <a14:hiddenFill xmlns:a14="http://schemas.microsoft.com/office/drawing/2010/main">
+              <a14:hiddenFill xmlns="" xmlns:a14="http://schemas.microsoft.com/office/drawing/2010/main">
                 <a:solidFill>
                   <a:srgbClr val="FFFFFF"/>
                 </a:solidFill>
@@ -17584,7 +18684,7 @@
           <a:blip r:embed="rId4" cstate="print">
             <a:extLst>
               <a:ext uri="{28A0092B-C50C-407E-A947-70E740481C1C}">
-                <a14:useLocalDpi xmlns:a14="http://schemas.microsoft.com/office/drawing/2010/main" val="0"/>
+                <a14:useLocalDpi xmlns="" xmlns:a14="http://schemas.microsoft.com/office/drawing/2010/main" val="0"/>
               </a:ext>
             </a:extLst>
           </a:blip>
@@ -17604,7 +18704,7 @@
           <a:noFill/>
           <a:extLst>
             <a:ext uri="{909E8E84-426E-40DD-AFC4-6F175D3DCCD1}">
-              <a14:hiddenFill xmlns:a14="http://schemas.microsoft.com/office/drawing/2010/main">
+              <a14:hiddenFill xmlns="" xmlns:a14="http://schemas.microsoft.com/office/drawing/2010/main">
                 <a:solidFill>
                   <a:srgbClr val="FFFFFF"/>
                 </a:solidFill>
@@ -17625,7 +18725,7 @@
           <a:blip r:embed="rId5" cstate="print">
             <a:extLst>
               <a:ext uri="{28A0092B-C50C-407E-A947-70E740481C1C}">
-                <a14:useLocalDpi xmlns:a14="http://schemas.microsoft.com/office/drawing/2010/main" val="0"/>
+                <a14:useLocalDpi xmlns="" xmlns:a14="http://schemas.microsoft.com/office/drawing/2010/main" val="0"/>
               </a:ext>
             </a:extLst>
           </a:blip>
@@ -17648,14 +18748,14 @@
           </a:ln>
           <a:extLst>
             <a:ext uri="{909E8E84-426E-40DD-AFC4-6F175D3DCCD1}">
-              <a14:hiddenFill xmlns:a14="http://schemas.microsoft.com/office/drawing/2010/main">
+              <a14:hiddenFill xmlns="" xmlns:a14="http://schemas.microsoft.com/office/drawing/2010/main">
                 <a:solidFill>
                   <a:schemeClr val="accent1"/>
                 </a:solidFill>
               </a14:hiddenFill>
             </a:ext>
             <a:ext uri="{91240B29-F687-4F45-9708-019B960494DF}">
-              <a14:hiddenLine xmlns:a14="http://schemas.microsoft.com/office/drawing/2010/main" w="9525">
+              <a14:hiddenLine xmlns="" xmlns:a14="http://schemas.microsoft.com/office/drawing/2010/main" w="9525">
                 <a:solidFill>
                   <a:schemeClr val="tx1"/>
                 </a:solidFill>
@@ -17679,7 +18779,7 @@
           <a:blip r:embed="rId5" cstate="print">
             <a:extLst>
               <a:ext uri="{28A0092B-C50C-407E-A947-70E740481C1C}">
-                <a14:useLocalDpi xmlns:a14="http://schemas.microsoft.com/office/drawing/2010/main" val="0"/>
+                <a14:useLocalDpi xmlns="" xmlns:a14="http://schemas.microsoft.com/office/drawing/2010/main" val="0"/>
               </a:ext>
             </a:extLst>
           </a:blip>
@@ -17702,14 +18802,14 @@
           </a:ln>
           <a:extLst>
             <a:ext uri="{909E8E84-426E-40DD-AFC4-6F175D3DCCD1}">
-              <a14:hiddenFill xmlns:a14="http://schemas.microsoft.com/office/drawing/2010/main">
+              <a14:hiddenFill xmlns="" xmlns:a14="http://schemas.microsoft.com/office/drawing/2010/main">
                 <a:solidFill>
                   <a:schemeClr val="accent1"/>
                 </a:solidFill>
               </a14:hiddenFill>
             </a:ext>
             <a:ext uri="{91240B29-F687-4F45-9708-019B960494DF}">
-              <a14:hiddenLine xmlns:a14="http://schemas.microsoft.com/office/drawing/2010/main" w="9525">
+              <a14:hiddenLine xmlns="" xmlns:a14="http://schemas.microsoft.com/office/drawing/2010/main" w="9525">
                 <a:solidFill>
                   <a:schemeClr val="tx1"/>
                 </a:solidFill>
@@ -17733,7 +18833,7 @@
           <a:blip r:embed="rId5" cstate="print">
             <a:extLst>
               <a:ext uri="{28A0092B-C50C-407E-A947-70E740481C1C}">
-                <a14:useLocalDpi xmlns:a14="http://schemas.microsoft.com/office/drawing/2010/main" val="0"/>
+                <a14:useLocalDpi xmlns="" xmlns:a14="http://schemas.microsoft.com/office/drawing/2010/main" val="0"/>
               </a:ext>
             </a:extLst>
           </a:blip>
@@ -17756,14 +18856,14 @@
           </a:ln>
           <a:extLst>
             <a:ext uri="{909E8E84-426E-40DD-AFC4-6F175D3DCCD1}">
-              <a14:hiddenFill xmlns:a14="http://schemas.microsoft.com/office/drawing/2010/main">
+              <a14:hiddenFill xmlns="" xmlns:a14="http://schemas.microsoft.com/office/drawing/2010/main">
                 <a:solidFill>
                   <a:schemeClr val="accent1"/>
                 </a:solidFill>
               </a14:hiddenFill>
             </a:ext>
             <a:ext uri="{91240B29-F687-4F45-9708-019B960494DF}">
-              <a14:hiddenLine xmlns:a14="http://schemas.microsoft.com/office/drawing/2010/main" w="9525">
+              <a14:hiddenLine xmlns="" xmlns:a14="http://schemas.microsoft.com/office/drawing/2010/main" w="9525">
                 <a:solidFill>
                   <a:schemeClr val="tx1"/>
                 </a:solidFill>
@@ -17787,7 +18887,7 @@
           <a:blip r:embed="rId5" cstate="print">
             <a:extLst>
               <a:ext uri="{28A0092B-C50C-407E-A947-70E740481C1C}">
-                <a14:useLocalDpi xmlns:a14="http://schemas.microsoft.com/office/drawing/2010/main" val="0"/>
+                <a14:useLocalDpi xmlns="" xmlns:a14="http://schemas.microsoft.com/office/drawing/2010/main" val="0"/>
               </a:ext>
             </a:extLst>
           </a:blip>
@@ -17810,14 +18910,14 @@
           </a:ln>
           <a:extLst>
             <a:ext uri="{909E8E84-426E-40DD-AFC4-6F175D3DCCD1}">
-              <a14:hiddenFill xmlns:a14="http://schemas.microsoft.com/office/drawing/2010/main">
+              <a14:hiddenFill xmlns="" xmlns:a14="http://schemas.microsoft.com/office/drawing/2010/main">
                 <a:solidFill>
                   <a:schemeClr val="accent1"/>
                 </a:solidFill>
               </a14:hiddenFill>
             </a:ext>
             <a:ext uri="{91240B29-F687-4F45-9708-019B960494DF}">
-              <a14:hiddenLine xmlns:a14="http://schemas.microsoft.com/office/drawing/2010/main" w="9525">
+              <a14:hiddenLine xmlns="" xmlns:a14="http://schemas.microsoft.com/office/drawing/2010/main" w="9525">
                 <a:solidFill>
                   <a:schemeClr val="tx1"/>
                 </a:solidFill>
@@ -17841,7 +18941,7 @@
           <a:blip r:embed="rId5" cstate="print">
             <a:extLst>
               <a:ext uri="{28A0092B-C50C-407E-A947-70E740481C1C}">
-                <a14:useLocalDpi xmlns:a14="http://schemas.microsoft.com/office/drawing/2010/main" val="0"/>
+                <a14:useLocalDpi xmlns="" xmlns:a14="http://schemas.microsoft.com/office/drawing/2010/main" val="0"/>
               </a:ext>
             </a:extLst>
           </a:blip>
@@ -17864,14 +18964,14 @@
           </a:ln>
           <a:extLst>
             <a:ext uri="{909E8E84-426E-40DD-AFC4-6F175D3DCCD1}">
-              <a14:hiddenFill xmlns:a14="http://schemas.microsoft.com/office/drawing/2010/main">
+              <a14:hiddenFill xmlns="" xmlns:a14="http://schemas.microsoft.com/office/drawing/2010/main">
                 <a:solidFill>
                   <a:schemeClr val="accent1"/>
                 </a:solidFill>
               </a14:hiddenFill>
             </a:ext>
             <a:ext uri="{91240B29-F687-4F45-9708-019B960494DF}">
-              <a14:hiddenLine xmlns:a14="http://schemas.microsoft.com/office/drawing/2010/main" w="9525">
+              <a14:hiddenLine xmlns="" xmlns:a14="http://schemas.microsoft.com/office/drawing/2010/main" w="9525">
                 <a:solidFill>
                   <a:schemeClr val="tx1"/>
                 </a:solidFill>
@@ -17895,7 +18995,7 @@
           <a:blip r:embed="rId5" cstate="print">
             <a:extLst>
               <a:ext uri="{28A0092B-C50C-407E-A947-70E740481C1C}">
-                <a14:useLocalDpi xmlns:a14="http://schemas.microsoft.com/office/drawing/2010/main" val="0"/>
+                <a14:useLocalDpi xmlns="" xmlns:a14="http://schemas.microsoft.com/office/drawing/2010/main" val="0"/>
               </a:ext>
             </a:extLst>
           </a:blip>
@@ -17918,14 +19018,14 @@
           </a:ln>
           <a:extLst>
             <a:ext uri="{909E8E84-426E-40DD-AFC4-6F175D3DCCD1}">
-              <a14:hiddenFill xmlns:a14="http://schemas.microsoft.com/office/drawing/2010/main">
+              <a14:hiddenFill xmlns="" xmlns:a14="http://schemas.microsoft.com/office/drawing/2010/main">
                 <a:solidFill>
                   <a:schemeClr val="accent1"/>
                 </a:solidFill>
               </a14:hiddenFill>
             </a:ext>
             <a:ext uri="{91240B29-F687-4F45-9708-019B960494DF}">
-              <a14:hiddenLine xmlns:a14="http://schemas.microsoft.com/office/drawing/2010/main" w="9525">
+              <a14:hiddenLine xmlns="" xmlns:a14="http://schemas.microsoft.com/office/drawing/2010/main" w="9525">
                 <a:solidFill>
                   <a:schemeClr val="tx1"/>
                 </a:solidFill>
@@ -17940,7 +19040,7 @@
     </p:spTree>
     <p:extLst>
       <p:ext uri="{BB962C8B-B14F-4D97-AF65-F5344CB8AC3E}">
-        <p14:creationId xmlns:p14="http://schemas.microsoft.com/office/powerpoint/2010/main" val="2211183367"/>
+        <p14:creationId xmlns="" xmlns:p14="http://schemas.microsoft.com/office/powerpoint/2010/main" val="2211183367"/>
       </p:ext>
     </p:extLst>
   </p:cSld>
@@ -18216,7 +19316,7 @@
           <a:blip r:embed="rId3" cstate="print">
             <a:extLst>
               <a:ext uri="{28A0092B-C50C-407E-A947-70E740481C1C}">
-                <a14:useLocalDpi xmlns:a14="http://schemas.microsoft.com/office/drawing/2010/main" val="0"/>
+                <a14:useLocalDpi xmlns="" xmlns:a14="http://schemas.microsoft.com/office/drawing/2010/main" val="0"/>
               </a:ext>
             </a:extLst>
           </a:blip>
@@ -18236,7 +19336,7 @@
           <a:noFill/>
           <a:extLst>
             <a:ext uri="{909E8E84-426E-40DD-AFC4-6F175D3DCCD1}">
-              <a14:hiddenFill xmlns:a14="http://schemas.microsoft.com/office/drawing/2010/main">
+              <a14:hiddenFill xmlns="" xmlns:a14="http://schemas.microsoft.com/office/drawing/2010/main">
                 <a:solidFill>
                   <a:srgbClr val="FFFFFF"/>
                 </a:solidFill>
@@ -18254,10 +19354,10 @@
           <p:nvPr/>
         </p:nvPicPr>
         <p:blipFill>
-          <a:blip r:embed="rId4">
+          <a:blip r:embed="rId4" cstate="print">
             <a:extLst>
               <a:ext uri="{28A0092B-C50C-407E-A947-70E740481C1C}">
-                <a14:useLocalDpi xmlns:a14="http://schemas.microsoft.com/office/drawing/2010/main" val="0"/>
+                <a14:useLocalDpi xmlns="" xmlns:a14="http://schemas.microsoft.com/office/drawing/2010/main" val="0"/>
               </a:ext>
             </a:extLst>
           </a:blip>
@@ -18277,7 +19377,7 @@
           <a:noFill/>
           <a:extLst>
             <a:ext uri="{909E8E84-426E-40DD-AFC4-6F175D3DCCD1}">
-              <a14:hiddenFill xmlns:a14="http://schemas.microsoft.com/office/drawing/2010/main">
+              <a14:hiddenFill xmlns="" xmlns:a14="http://schemas.microsoft.com/office/drawing/2010/main">
                 <a:solidFill>
                   <a:srgbClr val="FFFFFF"/>
                 </a:solidFill>
@@ -18298,7 +19398,7 @@
           <a:blip r:embed="rId5" cstate="print">
             <a:extLst>
               <a:ext uri="{28A0092B-C50C-407E-A947-70E740481C1C}">
-                <a14:useLocalDpi xmlns:a14="http://schemas.microsoft.com/office/drawing/2010/main" val="0"/>
+                <a14:useLocalDpi xmlns="" xmlns:a14="http://schemas.microsoft.com/office/drawing/2010/main" val="0"/>
               </a:ext>
             </a:extLst>
           </a:blip>
@@ -18318,7 +19418,7 @@
           <a:noFill/>
           <a:extLst>
             <a:ext uri="{909E8E84-426E-40DD-AFC4-6F175D3DCCD1}">
-              <a14:hiddenFill xmlns:a14="http://schemas.microsoft.com/office/drawing/2010/main">
+              <a14:hiddenFill xmlns="" xmlns:a14="http://schemas.microsoft.com/office/drawing/2010/main">
                 <a:solidFill>
                   <a:srgbClr val="FFFFFF"/>
                 </a:solidFill>
@@ -18967,7 +20067,7 @@
     </p:spTree>
     <p:extLst>
       <p:ext uri="{BB962C8B-B14F-4D97-AF65-F5344CB8AC3E}">
-        <p14:creationId xmlns:p14="http://schemas.microsoft.com/office/powerpoint/2010/main" val="1012388908"/>
+        <p14:creationId xmlns="" xmlns:p14="http://schemas.microsoft.com/office/powerpoint/2010/main" val="1012388908"/>
       </p:ext>
     </p:extLst>
   </p:cSld>
@@ -19518,7 +20618,7 @@
           <a:blip r:embed="rId3" cstate="print">
             <a:extLst>
               <a:ext uri="{28A0092B-C50C-407E-A947-70E740481C1C}">
-                <a14:useLocalDpi xmlns:a14="http://schemas.microsoft.com/office/drawing/2010/main" val="0"/>
+                <a14:useLocalDpi xmlns="" xmlns:a14="http://schemas.microsoft.com/office/drawing/2010/main" val="0"/>
               </a:ext>
             </a:extLst>
           </a:blip>
@@ -19538,7 +20638,7 @@
           <a:noFill/>
           <a:extLst>
             <a:ext uri="{909E8E84-426E-40DD-AFC4-6F175D3DCCD1}">
-              <a14:hiddenFill xmlns:a14="http://schemas.microsoft.com/office/drawing/2010/main">
+              <a14:hiddenFill xmlns="" xmlns:a14="http://schemas.microsoft.com/office/drawing/2010/main">
                 <a:solidFill>
                   <a:srgbClr val="FFFFFF"/>
                 </a:solidFill>
@@ -19559,7 +20659,7 @@
           <a:blip r:embed="rId4" cstate="print">
             <a:extLst>
               <a:ext uri="{28A0092B-C50C-407E-A947-70E740481C1C}">
-                <a14:useLocalDpi xmlns:a14="http://schemas.microsoft.com/office/drawing/2010/main" val="0"/>
+                <a14:useLocalDpi xmlns="" xmlns:a14="http://schemas.microsoft.com/office/drawing/2010/main" val="0"/>
               </a:ext>
             </a:extLst>
           </a:blip>
@@ -19579,7 +20679,7 @@
           <a:noFill/>
           <a:extLst>
             <a:ext uri="{909E8E84-426E-40DD-AFC4-6F175D3DCCD1}">
-              <a14:hiddenFill xmlns:a14="http://schemas.microsoft.com/office/drawing/2010/main">
+              <a14:hiddenFill xmlns="" xmlns:a14="http://schemas.microsoft.com/office/drawing/2010/main">
                 <a:solidFill>
                   <a:srgbClr val="FFFFFF"/>
                 </a:solidFill>
@@ -19600,7 +20700,7 @@
           <a:blip r:embed="rId5" cstate="print">
             <a:extLst>
               <a:ext uri="{28A0092B-C50C-407E-A947-70E740481C1C}">
-                <a14:useLocalDpi xmlns:a14="http://schemas.microsoft.com/office/drawing/2010/main" val="0"/>
+                <a14:useLocalDpi xmlns="" xmlns:a14="http://schemas.microsoft.com/office/drawing/2010/main" val="0"/>
               </a:ext>
             </a:extLst>
           </a:blip>
@@ -19620,7 +20720,7 @@
           <a:noFill/>
           <a:extLst>
             <a:ext uri="{909E8E84-426E-40DD-AFC4-6F175D3DCCD1}">
-              <a14:hiddenFill xmlns:a14="http://schemas.microsoft.com/office/drawing/2010/main">
+              <a14:hiddenFill xmlns="" xmlns:a14="http://schemas.microsoft.com/office/drawing/2010/main">
                 <a:solidFill>
                   <a:srgbClr val="FFFFFF"/>
                 </a:solidFill>
@@ -19641,7 +20741,7 @@
           <a:blip r:embed="rId6" cstate="print">
             <a:extLst>
               <a:ext uri="{28A0092B-C50C-407E-A947-70E740481C1C}">
-                <a14:useLocalDpi xmlns:a14="http://schemas.microsoft.com/office/drawing/2010/main" val="0"/>
+                <a14:useLocalDpi xmlns="" xmlns:a14="http://schemas.microsoft.com/office/drawing/2010/main" val="0"/>
               </a:ext>
             </a:extLst>
           </a:blip>
@@ -19661,7 +20761,7 @@
           <a:noFill/>
           <a:extLst>
             <a:ext uri="{909E8E84-426E-40DD-AFC4-6F175D3DCCD1}">
-              <a14:hiddenFill xmlns:a14="http://schemas.microsoft.com/office/drawing/2010/main">
+              <a14:hiddenFill xmlns="" xmlns:a14="http://schemas.microsoft.com/office/drawing/2010/main">
                 <a:solidFill>
                   <a:srgbClr val="FFFFFF"/>
                 </a:solidFill>
@@ -19682,7 +20782,7 @@
           <a:blip r:embed="rId7" cstate="print">
             <a:extLst>
               <a:ext uri="{28A0092B-C50C-407E-A947-70E740481C1C}">
-                <a14:useLocalDpi xmlns:a14="http://schemas.microsoft.com/office/drawing/2010/main" val="0"/>
+                <a14:useLocalDpi xmlns="" xmlns:a14="http://schemas.microsoft.com/office/drawing/2010/main" val="0"/>
               </a:ext>
             </a:extLst>
           </a:blip>
@@ -19702,7 +20802,7 @@
           <a:noFill/>
           <a:extLst>
             <a:ext uri="{909E8E84-426E-40DD-AFC4-6F175D3DCCD1}">
-              <a14:hiddenFill xmlns:a14="http://schemas.microsoft.com/office/drawing/2010/main">
+              <a14:hiddenFill xmlns="" xmlns:a14="http://schemas.microsoft.com/office/drawing/2010/main">
                 <a:solidFill>
                   <a:srgbClr val="FFFFFF"/>
                 </a:solidFill>
@@ -19752,7 +20852,7 @@
     </p:spTree>
     <p:extLst>
       <p:ext uri="{BB962C8B-B14F-4D97-AF65-F5344CB8AC3E}">
-        <p14:creationId xmlns:p14="http://schemas.microsoft.com/office/powerpoint/2010/main" val="2609422"/>
+        <p14:creationId xmlns="" xmlns:p14="http://schemas.microsoft.com/office/powerpoint/2010/main" val="2609422"/>
       </p:ext>
     </p:extLst>
   </p:cSld>

</xml_diff>